<commit_message>
Updated RSA Searchlight explainer to cover stats
</commit_message>
<xml_diff>
--- a/Explainers/SearchlightRSA.pptx
+++ b/Explainers/SearchlightRSA.pptx
@@ -14,6 +14,11 @@
     <p:sldId id="259" r:id="rId8"/>
     <p:sldId id="260" r:id="rId9"/>
     <p:sldId id="261" r:id="rId10"/>
+    <p:sldId id="266" r:id="rId11"/>
+    <p:sldId id="419" r:id="rId12"/>
+    <p:sldId id="435" r:id="rId13"/>
+    <p:sldId id="436" r:id="rId14"/>
+    <p:sldId id="267" r:id="rId15"/>
   </p:sldIdLst>
   <p:sldSz cx="12192000" cy="6858000"/>
   <p:notesSz cx="6858000" cy="9144000"/>
@@ -133,7 +138,13 @@
           </p14:sldIdLst>
         </p14:section>
         <p14:section name="3. Searchlight RSA - stats" id="{2F55AFB8-AA5E-417E-8DEE-0FA27E6669A0}">
-          <p14:sldIdLst/>
+          <p14:sldIdLst>
+            <p14:sldId id="266"/>
+            <p14:sldId id="419"/>
+            <p14:sldId id="435"/>
+            <p14:sldId id="436"/>
+            <p14:sldId id="267"/>
+          </p14:sldIdLst>
         </p14:section>
       </p14:sectionLst>
     </p:ext>
@@ -291,7 +302,7 @@
           <a:p>
             <a:fld id="{0C5A9D22-2270-48BF-829C-A539854D81CB}" type="datetimeFigureOut">
               <a:rPr lang="en-US" smtClean="0"/>
-              <a:t>9/10/2020</a:t>
+              <a:t>9/29/2020</a:t>
             </a:fld>
             <a:endParaRPr lang="en-US"/>
           </a:p>
@@ -489,7 +500,7 @@
           <a:p>
             <a:fld id="{0C5A9D22-2270-48BF-829C-A539854D81CB}" type="datetimeFigureOut">
               <a:rPr lang="en-US" smtClean="0"/>
-              <a:t>9/10/2020</a:t>
+              <a:t>9/29/2020</a:t>
             </a:fld>
             <a:endParaRPr lang="en-US"/>
           </a:p>
@@ -697,7 +708,7 @@
           <a:p>
             <a:fld id="{0C5A9D22-2270-48BF-829C-A539854D81CB}" type="datetimeFigureOut">
               <a:rPr lang="en-US" smtClean="0"/>
-              <a:t>9/10/2020</a:t>
+              <a:t>9/29/2020</a:t>
             </a:fld>
             <a:endParaRPr lang="en-US"/>
           </a:p>
@@ -895,7 +906,7 @@
           <a:p>
             <a:fld id="{0C5A9D22-2270-48BF-829C-A539854D81CB}" type="datetimeFigureOut">
               <a:rPr lang="en-US" smtClean="0"/>
-              <a:t>9/10/2020</a:t>
+              <a:t>9/29/2020</a:t>
             </a:fld>
             <a:endParaRPr lang="en-US"/>
           </a:p>
@@ -1170,7 +1181,7 @@
           <a:p>
             <a:fld id="{0C5A9D22-2270-48BF-829C-A539854D81CB}" type="datetimeFigureOut">
               <a:rPr lang="en-US" smtClean="0"/>
-              <a:t>9/10/2020</a:t>
+              <a:t>9/29/2020</a:t>
             </a:fld>
             <a:endParaRPr lang="en-US"/>
           </a:p>
@@ -1435,7 +1446,7 @@
           <a:p>
             <a:fld id="{0C5A9D22-2270-48BF-829C-A539854D81CB}" type="datetimeFigureOut">
               <a:rPr lang="en-US" smtClean="0"/>
-              <a:t>9/10/2020</a:t>
+              <a:t>9/29/2020</a:t>
             </a:fld>
             <a:endParaRPr lang="en-US"/>
           </a:p>
@@ -1847,7 +1858,7 @@
           <a:p>
             <a:fld id="{0C5A9D22-2270-48BF-829C-A539854D81CB}" type="datetimeFigureOut">
               <a:rPr lang="en-US" smtClean="0"/>
-              <a:t>9/10/2020</a:t>
+              <a:t>9/29/2020</a:t>
             </a:fld>
             <a:endParaRPr lang="en-US"/>
           </a:p>
@@ -1988,7 +1999,7 @@
           <a:p>
             <a:fld id="{0C5A9D22-2270-48BF-829C-A539854D81CB}" type="datetimeFigureOut">
               <a:rPr lang="en-US" smtClean="0"/>
-              <a:t>9/10/2020</a:t>
+              <a:t>9/29/2020</a:t>
             </a:fld>
             <a:endParaRPr lang="en-US"/>
           </a:p>
@@ -2101,7 +2112,7 @@
           <a:p>
             <a:fld id="{0C5A9D22-2270-48BF-829C-A539854D81CB}" type="datetimeFigureOut">
               <a:rPr lang="en-US" smtClean="0"/>
-              <a:t>9/10/2020</a:t>
+              <a:t>9/29/2020</a:t>
             </a:fld>
             <a:endParaRPr lang="en-US"/>
           </a:p>
@@ -2412,7 +2423,7 @@
           <a:p>
             <a:fld id="{0C5A9D22-2270-48BF-829C-A539854D81CB}" type="datetimeFigureOut">
               <a:rPr lang="en-US" smtClean="0"/>
-              <a:t>9/10/2020</a:t>
+              <a:t>9/29/2020</a:t>
             </a:fld>
             <a:endParaRPr lang="en-US"/>
           </a:p>
@@ -2700,7 +2711,7 @@
           <a:p>
             <a:fld id="{0C5A9D22-2270-48BF-829C-A539854D81CB}" type="datetimeFigureOut">
               <a:rPr lang="en-US" smtClean="0"/>
-              <a:t>9/10/2020</a:t>
+              <a:t>9/29/2020</a:t>
             </a:fld>
             <a:endParaRPr lang="en-US"/>
           </a:p>
@@ -2941,7 +2952,7 @@
           <a:p>
             <a:fld id="{0C5A9D22-2270-48BF-829C-A539854D81CB}" type="datetimeFigureOut">
               <a:rPr lang="en-US" smtClean="0"/>
-              <a:t>9/10/2020</a:t>
+              <a:t>9/29/2020</a:t>
             </a:fld>
             <a:endParaRPr lang="en-US"/>
           </a:p>
@@ -3514,6 +3525,2287 @@
 </p:sld>
 </file>
 
+<file path=ppt/slides/slide10.xml><?xml version="1.0" encoding="utf-8"?>
+<p:sld xmlns:a="http://schemas.openxmlformats.org/drawingml/2006/main" xmlns:r="http://schemas.openxmlformats.org/officeDocument/2006/relationships" xmlns:p="http://schemas.openxmlformats.org/presentationml/2006/main">
+  <p:cSld>
+    <p:spTree>
+      <p:nvGrpSpPr>
+        <p:cNvPr id="1" name=""/>
+        <p:cNvGrpSpPr/>
+        <p:nvPr/>
+      </p:nvGrpSpPr>
+      <p:grpSpPr>
+        <a:xfrm>
+          <a:off x="0" y="0"/>
+          <a:ext cx="0" cy="0"/>
+          <a:chOff x="0" y="0"/>
+          <a:chExt cx="0" cy="0"/>
+        </a:xfrm>
+      </p:grpSpPr>
+      <p:sp>
+        <p:nvSpPr>
+          <p:cNvPr id="2" name="Title 1">
+            <a:extLst>
+              <a:ext uri="{FF2B5EF4-FFF2-40B4-BE49-F238E27FC236}">
+                <a16:creationId xmlns:a16="http://schemas.microsoft.com/office/drawing/2014/main" id="{8E8DD544-ADED-4D21-B1A3-2E8D5EDD467C}"/>
+              </a:ext>
+            </a:extLst>
+          </p:cNvPr>
+          <p:cNvSpPr>
+            <a:spLocks noGrp="1"/>
+          </p:cNvSpPr>
+          <p:nvPr>
+            <p:ph type="title"/>
+          </p:nvPr>
+        </p:nvSpPr>
+        <p:spPr/>
+        <p:txBody>
+          <a:bodyPr/>
+          <a:lstStyle/>
+          <a:p>
+            <a:r>
+              <a:rPr lang="en-US" dirty="0"/>
+              <a:t>Doing stats on Searchlight RSA</a:t>
+            </a:r>
+          </a:p>
+        </p:txBody>
+      </p:sp>
+      <p:sp>
+        <p:nvSpPr>
+          <p:cNvPr id="3" name="Content Placeholder 2">
+            <a:extLst>
+              <a:ext uri="{FF2B5EF4-FFF2-40B4-BE49-F238E27FC236}">
+                <a16:creationId xmlns:a16="http://schemas.microsoft.com/office/drawing/2014/main" id="{242EF5CD-C94A-4799-9CAB-2DD5D5E6AD91}"/>
+              </a:ext>
+            </a:extLst>
+          </p:cNvPr>
+          <p:cNvSpPr>
+            <a:spLocks noGrp="1"/>
+          </p:cNvSpPr>
+          <p:nvPr>
+            <p:ph idx="1"/>
+          </p:nvPr>
+        </p:nvSpPr>
+        <p:spPr/>
+        <p:txBody>
+          <a:bodyPr/>
+          <a:lstStyle/>
+          <a:p>
+            <a:r>
+              <a:rPr lang="en-US" dirty="0"/>
+              <a:t>The common practice is to take 2 steps:</a:t>
+            </a:r>
+          </a:p>
+          <a:p>
+            <a:pPr marL="914400" lvl="1" indent="-457200">
+              <a:buFont typeface="+mj-lt"/>
+              <a:buAutoNum type="arabicPeriod"/>
+            </a:pPr>
+            <a:r>
+              <a:rPr lang="en-US" dirty="0"/>
+              <a:t>Voxel-level statistics (keep only the voxels with a significant correlation)</a:t>
+            </a:r>
+          </a:p>
+          <a:p>
+            <a:pPr marL="914400" lvl="1" indent="-457200">
+              <a:buFont typeface="+mj-lt"/>
+              <a:buAutoNum type="arabicPeriod"/>
+            </a:pPr>
+            <a:r>
+              <a:rPr lang="en-US" dirty="0"/>
+              <a:t>Cluster-level statistics (get rid of any tiny clusters, which are likely to be spurious)</a:t>
+            </a:r>
+          </a:p>
+          <a:p>
+            <a:pPr marL="457200" indent="-457200">
+              <a:buFont typeface="+mj-lt"/>
+              <a:buAutoNum type="arabicPeriod"/>
+            </a:pPr>
+            <a:endParaRPr lang="en-US" dirty="0"/>
+          </a:p>
+        </p:txBody>
+      </p:sp>
+    </p:spTree>
+    <p:extLst>
+      <p:ext uri="{BB962C8B-B14F-4D97-AF65-F5344CB8AC3E}">
+        <p14:creationId xmlns:p14="http://schemas.microsoft.com/office/powerpoint/2010/main" val="404539876"/>
+      </p:ext>
+    </p:extLst>
+  </p:cSld>
+  <p:clrMapOvr>
+    <a:masterClrMapping/>
+  </p:clrMapOvr>
+</p:sld>
+</file>
+
+<file path=ppt/slides/slide11.xml><?xml version="1.0" encoding="utf-8"?>
+<p:sld xmlns:a="http://schemas.openxmlformats.org/drawingml/2006/main" xmlns:r="http://schemas.openxmlformats.org/officeDocument/2006/relationships" xmlns:p="http://schemas.openxmlformats.org/presentationml/2006/main">
+  <p:cSld>
+    <p:spTree>
+      <p:nvGrpSpPr>
+        <p:cNvPr id="1" name=""/>
+        <p:cNvGrpSpPr/>
+        <p:nvPr/>
+      </p:nvGrpSpPr>
+      <p:grpSpPr>
+        <a:xfrm>
+          <a:off x="0" y="0"/>
+          <a:ext cx="0" cy="0"/>
+          <a:chOff x="0" y="0"/>
+          <a:chExt cx="0" cy="0"/>
+        </a:xfrm>
+      </p:grpSpPr>
+      <p:sp>
+        <p:nvSpPr>
+          <p:cNvPr id="2" name="Title 1">
+            <a:extLst>
+              <a:ext uri="{FF2B5EF4-FFF2-40B4-BE49-F238E27FC236}">
+                <a16:creationId xmlns:a16="http://schemas.microsoft.com/office/drawing/2014/main" id="{E163433B-FA2C-4512-BF73-51302150AE3F}"/>
+              </a:ext>
+            </a:extLst>
+          </p:cNvPr>
+          <p:cNvSpPr>
+            <a:spLocks noGrp="1"/>
+          </p:cNvSpPr>
+          <p:nvPr>
+            <p:ph type="title"/>
+          </p:nvPr>
+        </p:nvSpPr>
+        <p:spPr/>
+        <p:txBody>
+          <a:bodyPr/>
+          <a:lstStyle/>
+          <a:p>
+            <a:r>
+              <a:rPr lang="en-US" dirty="0"/>
+              <a:t>Voxel-Level statistics: permutation tests</a:t>
+            </a:r>
+          </a:p>
+        </p:txBody>
+      </p:sp>
+      <p:sp>
+        <p:nvSpPr>
+          <p:cNvPr id="5" name="TextBox 4">
+            <a:extLst>
+              <a:ext uri="{FF2B5EF4-FFF2-40B4-BE49-F238E27FC236}">
+                <a16:creationId xmlns:a16="http://schemas.microsoft.com/office/drawing/2014/main" id="{7A0855EC-C8B3-4A0E-881B-C0B7B095222C}"/>
+              </a:ext>
+            </a:extLst>
+          </p:cNvPr>
+          <p:cNvSpPr txBox="1"/>
+          <p:nvPr/>
+        </p:nvSpPr>
+        <p:spPr>
+          <a:xfrm>
+            <a:off x="838200" y="1578071"/>
+            <a:ext cx="10082375" cy="646331"/>
+          </a:xfrm>
+          <a:prstGeom prst="rect">
+            <a:avLst/>
+          </a:prstGeom>
+          <a:noFill/>
+        </p:spPr>
+        <p:txBody>
+          <a:bodyPr wrap="none" rtlCol="0">
+            <a:spAutoFit/>
+          </a:bodyPr>
+          <a:lstStyle/>
+          <a:p>
+            <a:r>
+              <a:rPr lang="en-US" u="sng" dirty="0"/>
+              <a:t>Goal:</a:t>
+            </a:r>
+            <a:r>
+              <a:rPr lang="en-US" dirty="0"/>
+              <a:t> generate a distribution of the correlations you’d expect in the absence of a real effect</a:t>
+            </a:r>
+          </a:p>
+          <a:p>
+            <a:r>
+              <a:rPr lang="en-US" u="sng" dirty="0"/>
+              <a:t>Outcome:</a:t>
+            </a:r>
+            <a:r>
+              <a:rPr lang="en-US" dirty="0"/>
+              <a:t> compare the correlation you’ve measured to that distribution, and decide whether it’s “real” or noise.</a:t>
+            </a:r>
+            <a:endParaRPr lang="en-US" u="sng" dirty="0"/>
+          </a:p>
+        </p:txBody>
+      </p:sp>
+      <p:sp>
+        <p:nvSpPr>
+          <p:cNvPr id="6" name="TextBox 5">
+            <a:extLst>
+              <a:ext uri="{FF2B5EF4-FFF2-40B4-BE49-F238E27FC236}">
+                <a16:creationId xmlns:a16="http://schemas.microsoft.com/office/drawing/2014/main" id="{52E4F93E-5184-475E-A94C-5CBE32E8DFE3}"/>
+              </a:ext>
+            </a:extLst>
+          </p:cNvPr>
+          <p:cNvSpPr txBox="1"/>
+          <p:nvPr/>
+        </p:nvSpPr>
+        <p:spPr>
+          <a:xfrm>
+            <a:off x="1228846" y="2560859"/>
+            <a:ext cx="1593065" cy="369332"/>
+          </a:xfrm>
+          <a:prstGeom prst="rect">
+            <a:avLst/>
+          </a:prstGeom>
+          <a:noFill/>
+        </p:spPr>
+        <p:txBody>
+          <a:bodyPr wrap="none" rtlCol="0">
+            <a:spAutoFit/>
+          </a:bodyPr>
+          <a:lstStyle/>
+          <a:p>
+            <a:r>
+              <a:rPr lang="en-US" dirty="0"/>
+              <a:t>In each voxel…</a:t>
+            </a:r>
+          </a:p>
+        </p:txBody>
+      </p:sp>
+      <p:sp>
+        <p:nvSpPr>
+          <p:cNvPr id="7" name="TextBox 6">
+            <a:extLst>
+              <a:ext uri="{FF2B5EF4-FFF2-40B4-BE49-F238E27FC236}">
+                <a16:creationId xmlns:a16="http://schemas.microsoft.com/office/drawing/2014/main" id="{EA0403BC-53D1-4916-BE4C-762ECC5498B9}"/>
+              </a:ext>
+            </a:extLst>
+          </p:cNvPr>
+          <p:cNvSpPr txBox="1"/>
+          <p:nvPr/>
+        </p:nvSpPr>
+        <p:spPr>
+          <a:xfrm>
+            <a:off x="1157539" y="3051705"/>
+            <a:ext cx="6805261" cy="1200329"/>
+          </a:xfrm>
+          <a:prstGeom prst="rect">
+            <a:avLst/>
+          </a:prstGeom>
+          <a:noFill/>
+        </p:spPr>
+        <p:txBody>
+          <a:bodyPr wrap="none" rtlCol="0">
+            <a:spAutoFit/>
+          </a:bodyPr>
+          <a:lstStyle/>
+          <a:p>
+            <a:pPr marL="342900" indent="-342900">
+              <a:buAutoNum type="arabicPeriod"/>
+            </a:pPr>
+            <a:r>
+              <a:rPr lang="en-US" dirty="0"/>
+              <a:t>Shuffle the brain RDM</a:t>
+            </a:r>
+          </a:p>
+          <a:p>
+            <a:pPr marL="342900" indent="-342900">
+              <a:buAutoNum type="arabicPeriod"/>
+            </a:pPr>
+            <a:r>
+              <a:rPr lang="en-US" dirty="0"/>
+              <a:t>Correlate the shuffled brain RDM with the behavioral RDM</a:t>
+            </a:r>
+          </a:p>
+          <a:p>
+            <a:pPr marL="342900" indent="-342900">
+              <a:buAutoNum type="arabicPeriod"/>
+            </a:pPr>
+            <a:r>
+              <a:rPr lang="en-US" dirty="0"/>
+              <a:t>Repeat 100-1000x </a:t>
+            </a:r>
+            <a:r>
+              <a:rPr lang="en-US" dirty="0">
+                <a:sym typeface="Wingdings" panose="05000000000000000000" pitchFamily="2" charset="2"/>
+              </a:rPr>
+              <a:t> distribution of noise correlations</a:t>
+            </a:r>
+          </a:p>
+          <a:p>
+            <a:pPr marL="342900" indent="-342900">
+              <a:buAutoNum type="arabicPeriod"/>
+            </a:pPr>
+            <a:r>
+              <a:rPr lang="en-US" dirty="0">
+                <a:sym typeface="Wingdings" panose="05000000000000000000" pitchFamily="2" charset="2"/>
+              </a:rPr>
+              <a:t>Compare the </a:t>
+            </a:r>
+            <a:r>
+              <a:rPr lang="en-US" dirty="0">
+                <a:solidFill>
+                  <a:srgbClr val="FF0000"/>
+                </a:solidFill>
+                <a:sym typeface="Wingdings" panose="05000000000000000000" pitchFamily="2" charset="2"/>
+              </a:rPr>
+              <a:t>real brain-behavior correlation </a:t>
+            </a:r>
+            <a:r>
+              <a:rPr lang="en-US" dirty="0">
+                <a:sym typeface="Wingdings" panose="05000000000000000000" pitchFamily="2" charset="2"/>
+              </a:rPr>
+              <a:t>with the noise distribution</a:t>
+            </a:r>
+            <a:endParaRPr lang="en-US" dirty="0"/>
+          </a:p>
+        </p:txBody>
+      </p:sp>
+      <p:sp>
+        <p:nvSpPr>
+          <p:cNvPr id="8" name="Cube 7">
+            <a:extLst>
+              <a:ext uri="{FF2B5EF4-FFF2-40B4-BE49-F238E27FC236}">
+                <a16:creationId xmlns:a16="http://schemas.microsoft.com/office/drawing/2014/main" id="{A2F05556-EB7F-4574-B187-C515209DAFFA}"/>
+              </a:ext>
+            </a:extLst>
+          </p:cNvPr>
+          <p:cNvSpPr/>
+          <p:nvPr/>
+        </p:nvSpPr>
+        <p:spPr>
+          <a:xfrm>
+            <a:off x="847146" y="2628187"/>
+            <a:ext cx="310393" cy="302004"/>
+          </a:xfrm>
+          <a:prstGeom prst="cube">
+            <a:avLst/>
+          </a:prstGeom>
+          <a:solidFill>
+            <a:schemeClr val="bg1"/>
+          </a:solidFill>
+          <a:ln>
+            <a:solidFill>
+              <a:schemeClr val="tx1"/>
+            </a:solidFill>
+          </a:ln>
+        </p:spPr>
+        <p:style>
+          <a:lnRef idx="2">
+            <a:schemeClr val="accent1">
+              <a:shade val="50000"/>
+            </a:schemeClr>
+          </a:lnRef>
+          <a:fillRef idx="1">
+            <a:schemeClr val="accent1"/>
+          </a:fillRef>
+          <a:effectRef idx="0">
+            <a:schemeClr val="accent1"/>
+          </a:effectRef>
+          <a:fontRef idx="minor">
+            <a:schemeClr val="lt1"/>
+          </a:fontRef>
+        </p:style>
+        <p:txBody>
+          <a:bodyPr rtlCol="0" anchor="ctr"/>
+          <a:lstStyle/>
+          <a:p>
+            <a:pPr algn="ctr"/>
+            <a:endParaRPr lang="en-US"/>
+          </a:p>
+        </p:txBody>
+      </p:sp>
+      <p:sp>
+        <p:nvSpPr>
+          <p:cNvPr id="9" name="TextBox 8">
+            <a:extLst>
+              <a:ext uri="{FF2B5EF4-FFF2-40B4-BE49-F238E27FC236}">
+                <a16:creationId xmlns:a16="http://schemas.microsoft.com/office/drawing/2014/main" id="{876F193B-1E2B-457D-A319-674050F293C7}"/>
+              </a:ext>
+            </a:extLst>
+          </p:cNvPr>
+          <p:cNvSpPr txBox="1"/>
+          <p:nvPr/>
+        </p:nvSpPr>
+        <p:spPr>
+          <a:xfrm>
+            <a:off x="3623942" y="4530013"/>
+            <a:ext cx="6320641" cy="923330"/>
+          </a:xfrm>
+          <a:prstGeom prst="rect">
+            <a:avLst/>
+          </a:prstGeom>
+          <a:noFill/>
+        </p:spPr>
+        <p:txBody>
+          <a:bodyPr wrap="none" rtlCol="0">
+            <a:spAutoFit/>
+          </a:bodyPr>
+          <a:lstStyle/>
+          <a:p>
+            <a:r>
+              <a:rPr lang="en-US" dirty="0"/>
+              <a:t>For </a:t>
+            </a:r>
+            <a:r>
+              <a:rPr lang="en-US" i="1" dirty="0"/>
+              <a:t>p</a:t>
+            </a:r>
+            <a:r>
+              <a:rPr lang="en-US" dirty="0"/>
+              <a:t> &lt; 0.01:</a:t>
+            </a:r>
+          </a:p>
+          <a:p>
+            <a:r>
+              <a:rPr lang="en-US" dirty="0"/>
+              <a:t>…If it’s &gt;= 99% of the noise distribution </a:t>
+            </a:r>
+            <a:r>
+              <a:rPr lang="en-US" dirty="0">
+                <a:sym typeface="Wingdings" panose="05000000000000000000" pitchFamily="2" charset="2"/>
+              </a:rPr>
+              <a:t> it’s real</a:t>
+            </a:r>
+          </a:p>
+          <a:p>
+            <a:r>
+              <a:rPr lang="en-US" dirty="0">
+                <a:sym typeface="Wingdings" panose="05000000000000000000" pitchFamily="2" charset="2"/>
+              </a:rPr>
+              <a:t>…If it’s &lt; 99% of the noise distribution  it’s noise, so mask it out</a:t>
+            </a:r>
+            <a:endParaRPr lang="en-US" dirty="0"/>
+          </a:p>
+        </p:txBody>
+      </p:sp>
+      <p:grpSp>
+        <p:nvGrpSpPr>
+          <p:cNvPr id="11" name="Group 10">
+            <a:extLst>
+              <a:ext uri="{FF2B5EF4-FFF2-40B4-BE49-F238E27FC236}">
+                <a16:creationId xmlns:a16="http://schemas.microsoft.com/office/drawing/2014/main" id="{7EA943BE-2C16-4CEE-9AF3-770075854649}"/>
+              </a:ext>
+            </a:extLst>
+          </p:cNvPr>
+          <p:cNvGrpSpPr/>
+          <p:nvPr/>
+        </p:nvGrpSpPr>
+        <p:grpSpPr>
+          <a:xfrm>
+            <a:off x="1228846" y="4444022"/>
+            <a:ext cx="2521509" cy="1490460"/>
+            <a:chOff x="945334" y="3435078"/>
+            <a:chExt cx="2521509" cy="1490460"/>
+          </a:xfrm>
+        </p:grpSpPr>
+        <p:cxnSp>
+          <p:nvCxnSpPr>
+            <p:cNvPr id="13" name="Straight Arrow Connector 12">
+              <a:extLst>
+                <a:ext uri="{FF2B5EF4-FFF2-40B4-BE49-F238E27FC236}">
+                  <a16:creationId xmlns:a16="http://schemas.microsoft.com/office/drawing/2014/main" id="{49F129B8-869A-4E00-A3F6-317E3B9E48F5}"/>
+                </a:ext>
+              </a:extLst>
+            </p:cNvPr>
+            <p:cNvCxnSpPr>
+              <a:cxnSpLocks/>
+            </p:cNvCxnSpPr>
+            <p:nvPr/>
+          </p:nvCxnSpPr>
+          <p:spPr>
+            <a:xfrm>
+              <a:off x="945334" y="4520726"/>
+              <a:ext cx="2521509" cy="0"/>
+            </a:xfrm>
+            <a:prstGeom prst="straightConnector1">
+              <a:avLst/>
+            </a:prstGeom>
+            <a:ln>
+              <a:tailEnd type="triangle"/>
+            </a:ln>
+          </p:spPr>
+          <p:style>
+            <a:lnRef idx="1">
+              <a:schemeClr val="dk1"/>
+            </a:lnRef>
+            <a:fillRef idx="0">
+              <a:schemeClr val="dk1"/>
+            </a:fillRef>
+            <a:effectRef idx="0">
+              <a:schemeClr val="dk1"/>
+            </a:effectRef>
+            <a:fontRef idx="minor">
+              <a:schemeClr val="tx1"/>
+            </a:fontRef>
+          </p:style>
+        </p:cxnSp>
+        <p:sp>
+          <p:nvSpPr>
+            <p:cNvPr id="14" name="TextBox 13">
+              <a:extLst>
+                <a:ext uri="{FF2B5EF4-FFF2-40B4-BE49-F238E27FC236}">
+                  <a16:creationId xmlns:a16="http://schemas.microsoft.com/office/drawing/2014/main" id="{07E79615-8440-49CC-9021-4FF404190EA4}"/>
+                </a:ext>
+              </a:extLst>
+            </p:cNvPr>
+            <p:cNvSpPr txBox="1"/>
+            <p:nvPr/>
+          </p:nvSpPr>
+          <p:spPr>
+            <a:xfrm>
+              <a:off x="1044262" y="4556206"/>
+              <a:ext cx="1776320" cy="369332"/>
+            </a:xfrm>
+            <a:prstGeom prst="rect">
+              <a:avLst/>
+            </a:prstGeom>
+            <a:noFill/>
+          </p:spPr>
+          <p:txBody>
+            <a:bodyPr wrap="none" rtlCol="0">
+              <a:spAutoFit/>
+            </a:bodyPr>
+            <a:lstStyle/>
+            <a:p>
+              <a:r>
+                <a:rPr lang="en-US" i="1" dirty="0"/>
+                <a:t>r </a:t>
+              </a:r>
+              <a:r>
+                <a:rPr lang="en-US" dirty="0"/>
+                <a:t>for shuffled data</a:t>
+              </a:r>
+              <a:endParaRPr lang="en-US" i="1" dirty="0"/>
+            </a:p>
+          </p:txBody>
+        </p:sp>
+        <p:sp>
+          <p:nvSpPr>
+            <p:cNvPr id="15" name="Freeform: Shape 14">
+              <a:extLst>
+                <a:ext uri="{FF2B5EF4-FFF2-40B4-BE49-F238E27FC236}">
+                  <a16:creationId xmlns:a16="http://schemas.microsoft.com/office/drawing/2014/main" id="{74E6BE5F-D6D2-4C07-AA91-ADF216E386A1}"/>
+                </a:ext>
+              </a:extLst>
+            </p:cNvPr>
+            <p:cNvSpPr/>
+            <p:nvPr/>
+          </p:nvSpPr>
+          <p:spPr>
+            <a:xfrm>
+              <a:off x="1008404" y="3435078"/>
+              <a:ext cx="1828800" cy="1068556"/>
+            </a:xfrm>
+            <a:custGeom>
+              <a:avLst/>
+              <a:gdLst>
+                <a:gd name="connsiteX0" fmla="*/ 0 w 1828800"/>
+                <a:gd name="connsiteY0" fmla="*/ 1068556 h 1068556"/>
+                <a:gd name="connsiteX1" fmla="*/ 264919 w 1828800"/>
+                <a:gd name="connsiteY1" fmla="*/ 948915 h 1068556"/>
+                <a:gd name="connsiteX2" fmla="*/ 461473 w 1828800"/>
+                <a:gd name="connsiteY2" fmla="*/ 632720 h 1068556"/>
+                <a:gd name="connsiteX3" fmla="*/ 529839 w 1828800"/>
+                <a:gd name="connsiteY3" fmla="*/ 188339 h 1068556"/>
+                <a:gd name="connsiteX4" fmla="*/ 752030 w 1828800"/>
+                <a:gd name="connsiteY4" fmla="*/ 331 h 1068556"/>
+                <a:gd name="connsiteX5" fmla="*/ 991312 w 1828800"/>
+                <a:gd name="connsiteY5" fmla="*/ 154156 h 1068556"/>
+                <a:gd name="connsiteX6" fmla="*/ 1145136 w 1828800"/>
+                <a:gd name="connsiteY6" fmla="*/ 547262 h 1068556"/>
+                <a:gd name="connsiteX7" fmla="*/ 1247686 w 1828800"/>
+                <a:gd name="connsiteY7" fmla="*/ 760907 h 1068556"/>
+                <a:gd name="connsiteX8" fmla="*/ 1375873 w 1828800"/>
+                <a:gd name="connsiteY8" fmla="*/ 948915 h 1068556"/>
+                <a:gd name="connsiteX9" fmla="*/ 1640792 w 1828800"/>
+                <a:gd name="connsiteY9" fmla="*/ 1042918 h 1068556"/>
+                <a:gd name="connsiteX10" fmla="*/ 1828800 w 1828800"/>
+                <a:gd name="connsiteY10" fmla="*/ 1060010 h 1068556"/>
+              </a:gdLst>
+              <a:ahLst/>
+              <a:cxnLst>
+                <a:cxn ang="0">
+                  <a:pos x="connsiteX0" y="connsiteY0"/>
+                </a:cxn>
+                <a:cxn ang="0">
+                  <a:pos x="connsiteX1" y="connsiteY1"/>
+                </a:cxn>
+                <a:cxn ang="0">
+                  <a:pos x="connsiteX2" y="connsiteY2"/>
+                </a:cxn>
+                <a:cxn ang="0">
+                  <a:pos x="connsiteX3" y="connsiteY3"/>
+                </a:cxn>
+                <a:cxn ang="0">
+                  <a:pos x="connsiteX4" y="connsiteY4"/>
+                </a:cxn>
+                <a:cxn ang="0">
+                  <a:pos x="connsiteX5" y="connsiteY5"/>
+                </a:cxn>
+                <a:cxn ang="0">
+                  <a:pos x="connsiteX6" y="connsiteY6"/>
+                </a:cxn>
+                <a:cxn ang="0">
+                  <a:pos x="connsiteX7" y="connsiteY7"/>
+                </a:cxn>
+                <a:cxn ang="0">
+                  <a:pos x="connsiteX8" y="connsiteY8"/>
+                </a:cxn>
+                <a:cxn ang="0">
+                  <a:pos x="connsiteX9" y="connsiteY9"/>
+                </a:cxn>
+                <a:cxn ang="0">
+                  <a:pos x="connsiteX10" y="connsiteY10"/>
+                </a:cxn>
+              </a:cxnLst>
+              <a:rect l="l" t="t" r="r" b="b"/>
+              <a:pathLst>
+                <a:path w="1828800" h="1068556">
+                  <a:moveTo>
+                    <a:pt x="0" y="1068556"/>
+                  </a:moveTo>
+                  <a:cubicBezTo>
+                    <a:pt x="94003" y="1045055"/>
+                    <a:pt x="188007" y="1021554"/>
+                    <a:pt x="264919" y="948915"/>
+                  </a:cubicBezTo>
+                  <a:cubicBezTo>
+                    <a:pt x="341831" y="876276"/>
+                    <a:pt x="417320" y="759483"/>
+                    <a:pt x="461473" y="632720"/>
+                  </a:cubicBezTo>
+                  <a:cubicBezTo>
+                    <a:pt x="505626" y="505957"/>
+                    <a:pt x="481413" y="293737"/>
+                    <a:pt x="529839" y="188339"/>
+                  </a:cubicBezTo>
+                  <a:cubicBezTo>
+                    <a:pt x="578265" y="82941"/>
+                    <a:pt x="675118" y="6028"/>
+                    <a:pt x="752030" y="331"/>
+                  </a:cubicBezTo>
+                  <a:cubicBezTo>
+                    <a:pt x="828942" y="-5366"/>
+                    <a:pt x="925794" y="63001"/>
+                    <a:pt x="991312" y="154156"/>
+                  </a:cubicBezTo>
+                  <a:cubicBezTo>
+                    <a:pt x="1056830" y="245311"/>
+                    <a:pt x="1102407" y="446137"/>
+                    <a:pt x="1145136" y="547262"/>
+                  </a:cubicBezTo>
+                  <a:cubicBezTo>
+                    <a:pt x="1187865" y="648387"/>
+                    <a:pt x="1209230" y="693965"/>
+                    <a:pt x="1247686" y="760907"/>
+                  </a:cubicBezTo>
+                  <a:cubicBezTo>
+                    <a:pt x="1286142" y="827849"/>
+                    <a:pt x="1310355" y="901913"/>
+                    <a:pt x="1375873" y="948915"/>
+                  </a:cubicBezTo>
+                  <a:cubicBezTo>
+                    <a:pt x="1441391" y="995917"/>
+                    <a:pt x="1565304" y="1024402"/>
+                    <a:pt x="1640792" y="1042918"/>
+                  </a:cubicBezTo>
+                  <a:cubicBezTo>
+                    <a:pt x="1716280" y="1061434"/>
+                    <a:pt x="1772540" y="1060722"/>
+                    <a:pt x="1828800" y="1060010"/>
+                  </a:cubicBezTo>
+                </a:path>
+              </a:pathLst>
+            </a:custGeom>
+            <a:solidFill>
+              <a:schemeClr val="accent5">
+                <a:lumMod val="40000"/>
+                <a:lumOff val="60000"/>
+              </a:schemeClr>
+            </a:solidFill>
+          </p:spPr>
+          <p:style>
+            <a:lnRef idx="2">
+              <a:schemeClr val="accent1">
+                <a:shade val="50000"/>
+              </a:schemeClr>
+            </a:lnRef>
+            <a:fillRef idx="1">
+              <a:schemeClr val="accent1"/>
+            </a:fillRef>
+            <a:effectRef idx="0">
+              <a:schemeClr val="accent1"/>
+            </a:effectRef>
+            <a:fontRef idx="minor">
+              <a:schemeClr val="lt1"/>
+            </a:fontRef>
+          </p:style>
+          <p:txBody>
+            <a:bodyPr rtlCol="0" anchor="ctr"/>
+            <a:lstStyle/>
+            <a:p>
+              <a:pPr algn="ctr"/>
+              <a:endParaRPr lang="en-US"/>
+            </a:p>
+          </p:txBody>
+        </p:sp>
+      </p:grpSp>
+      <p:cxnSp>
+        <p:nvCxnSpPr>
+          <p:cNvPr id="12" name="Straight Connector 11">
+            <a:extLst>
+              <a:ext uri="{FF2B5EF4-FFF2-40B4-BE49-F238E27FC236}">
+                <a16:creationId xmlns:a16="http://schemas.microsoft.com/office/drawing/2014/main" id="{57B0B424-BB2C-4C3C-BC5D-367A83B11B4D}"/>
+              </a:ext>
+            </a:extLst>
+          </p:cNvPr>
+          <p:cNvCxnSpPr/>
+          <p:nvPr/>
+        </p:nvCxnSpPr>
+        <p:spPr>
+          <a:xfrm>
+            <a:off x="2651971" y="4314232"/>
+            <a:ext cx="0" cy="1188720"/>
+          </a:xfrm>
+          <a:prstGeom prst="line">
+            <a:avLst/>
+          </a:prstGeom>
+          <a:ln>
+            <a:solidFill>
+              <a:srgbClr val="FF0000"/>
+            </a:solidFill>
+            <a:prstDash val="lgDash"/>
+          </a:ln>
+        </p:spPr>
+        <p:style>
+          <a:lnRef idx="1">
+            <a:schemeClr val="accent1"/>
+          </a:lnRef>
+          <a:fillRef idx="0">
+            <a:schemeClr val="accent1"/>
+          </a:fillRef>
+          <a:effectRef idx="0">
+            <a:schemeClr val="accent1"/>
+          </a:effectRef>
+          <a:fontRef idx="minor">
+            <a:schemeClr val="tx1"/>
+          </a:fontRef>
+        </p:style>
+      </p:cxnSp>
+    </p:spTree>
+    <p:extLst>
+      <p:ext uri="{BB962C8B-B14F-4D97-AF65-F5344CB8AC3E}">
+        <p14:creationId xmlns:p14="http://schemas.microsoft.com/office/powerpoint/2010/main" val="1136539066"/>
+      </p:ext>
+    </p:extLst>
+  </p:cSld>
+  <p:clrMapOvr>
+    <a:masterClrMapping/>
+  </p:clrMapOvr>
+</p:sld>
+</file>
+
+<file path=ppt/slides/slide12.xml><?xml version="1.0" encoding="utf-8"?>
+<p:sld xmlns:a="http://schemas.openxmlformats.org/drawingml/2006/main" xmlns:r="http://schemas.openxmlformats.org/officeDocument/2006/relationships" xmlns:p="http://schemas.openxmlformats.org/presentationml/2006/main">
+  <p:cSld>
+    <p:spTree>
+      <p:nvGrpSpPr>
+        <p:cNvPr id="1" name=""/>
+        <p:cNvGrpSpPr/>
+        <p:nvPr/>
+      </p:nvGrpSpPr>
+      <p:grpSpPr>
+        <a:xfrm>
+          <a:off x="0" y="0"/>
+          <a:ext cx="0" cy="0"/>
+          <a:chOff x="0" y="0"/>
+          <a:chExt cx="0" cy="0"/>
+        </a:xfrm>
+      </p:grpSpPr>
+      <p:sp>
+        <p:nvSpPr>
+          <p:cNvPr id="2" name="Title 1">
+            <a:extLst>
+              <a:ext uri="{FF2B5EF4-FFF2-40B4-BE49-F238E27FC236}">
+                <a16:creationId xmlns:a16="http://schemas.microsoft.com/office/drawing/2014/main" id="{A476AF1E-55CB-4F12-93B5-CA9758B691DA}"/>
+              </a:ext>
+            </a:extLst>
+          </p:cNvPr>
+          <p:cNvSpPr>
+            <a:spLocks noGrp="1"/>
+          </p:cNvSpPr>
+          <p:nvPr>
+            <p:ph type="title"/>
+          </p:nvPr>
+        </p:nvSpPr>
+        <p:spPr/>
+        <p:txBody>
+          <a:bodyPr/>
+          <a:lstStyle/>
+          <a:p>
+            <a:r>
+              <a:rPr lang="en-US" dirty="0"/>
+              <a:t>Cluster-Level statistics: more permutation tests</a:t>
+            </a:r>
+          </a:p>
+        </p:txBody>
+      </p:sp>
+      <p:sp>
+        <p:nvSpPr>
+          <p:cNvPr id="5" name="TextBox 4">
+            <a:extLst>
+              <a:ext uri="{FF2B5EF4-FFF2-40B4-BE49-F238E27FC236}">
+                <a16:creationId xmlns:a16="http://schemas.microsoft.com/office/drawing/2014/main" id="{2BF3D497-D2D1-4E31-8BD6-EB1DA067FACC}"/>
+              </a:ext>
+            </a:extLst>
+          </p:cNvPr>
+          <p:cNvSpPr txBox="1"/>
+          <p:nvPr/>
+        </p:nvSpPr>
+        <p:spPr>
+          <a:xfrm>
+            <a:off x="838200" y="1511885"/>
+            <a:ext cx="10736209" cy="646331"/>
+          </a:xfrm>
+          <a:prstGeom prst="rect">
+            <a:avLst/>
+          </a:prstGeom>
+          <a:noFill/>
+        </p:spPr>
+        <p:txBody>
+          <a:bodyPr wrap="none" rtlCol="0">
+            <a:spAutoFit/>
+          </a:bodyPr>
+          <a:lstStyle/>
+          <a:p>
+            <a:r>
+              <a:rPr lang="en-US" u="sng" dirty="0"/>
+              <a:t>Goal:</a:t>
+            </a:r>
+            <a:r>
+              <a:rPr lang="en-US" dirty="0"/>
+              <a:t> generate a distribution of the cluster sizes you’d expect in the absence of a real effect</a:t>
+            </a:r>
+          </a:p>
+          <a:p>
+            <a:r>
+              <a:rPr lang="en-US" u="sng" dirty="0"/>
+              <a:t>Outcome:</a:t>
+            </a:r>
+            <a:r>
+              <a:rPr lang="en-US" dirty="0"/>
+              <a:t> compare the cluster sizes after thresholding at the voxel level, and decide whether each one is big enough.</a:t>
+            </a:r>
+            <a:endParaRPr lang="en-US" u="sng" dirty="0"/>
+          </a:p>
+        </p:txBody>
+      </p:sp>
+      <p:sp>
+        <p:nvSpPr>
+          <p:cNvPr id="7" name="TextBox 6">
+            <a:extLst>
+              <a:ext uri="{FF2B5EF4-FFF2-40B4-BE49-F238E27FC236}">
+                <a16:creationId xmlns:a16="http://schemas.microsoft.com/office/drawing/2014/main" id="{10D9EDC9-3E41-4A52-B130-A0558670DC8C}"/>
+              </a:ext>
+            </a:extLst>
+          </p:cNvPr>
+          <p:cNvSpPr txBox="1"/>
+          <p:nvPr/>
+        </p:nvSpPr>
+        <p:spPr>
+          <a:xfrm>
+            <a:off x="838200" y="3199114"/>
+            <a:ext cx="9946826" cy="646331"/>
+          </a:xfrm>
+          <a:prstGeom prst="rect">
+            <a:avLst/>
+          </a:prstGeom>
+          <a:noFill/>
+        </p:spPr>
+        <p:txBody>
+          <a:bodyPr wrap="none" rtlCol="0">
+            <a:spAutoFit/>
+          </a:bodyPr>
+          <a:lstStyle/>
+          <a:p>
+            <a:pPr marL="342900" indent="-342900">
+              <a:buAutoNum type="arabicPeriod"/>
+            </a:pPr>
+            <a:r>
+              <a:rPr lang="en-US" dirty="0"/>
+              <a:t>Apply the voxel-level corrections to the </a:t>
+            </a:r>
+            <a:r>
+              <a:rPr lang="en-US" u="sng" dirty="0"/>
+              <a:t>shuffled data</a:t>
+            </a:r>
+            <a:r>
+              <a:rPr lang="en-US" dirty="0"/>
+              <a:t> results (from the previous set of permutation tests)</a:t>
+            </a:r>
+          </a:p>
+          <a:p>
+            <a:pPr marL="342900" indent="-342900">
+              <a:buAutoNum type="arabicPeriod"/>
+            </a:pPr>
+            <a:r>
+              <a:rPr lang="en-US" dirty="0"/>
+              <a:t>Identify the clusters in the corrected shuffle data, and measure their size</a:t>
+            </a:r>
+          </a:p>
+        </p:txBody>
+      </p:sp>
+      <p:sp>
+        <p:nvSpPr>
+          <p:cNvPr id="11" name="TextBox 10">
+            <a:extLst>
+              <a:ext uri="{FF2B5EF4-FFF2-40B4-BE49-F238E27FC236}">
+                <a16:creationId xmlns:a16="http://schemas.microsoft.com/office/drawing/2014/main" id="{6B03B0C8-94F8-4F5C-9F64-9F1CE48D0332}"/>
+              </a:ext>
+            </a:extLst>
+          </p:cNvPr>
+          <p:cNvSpPr txBox="1"/>
+          <p:nvPr/>
+        </p:nvSpPr>
+        <p:spPr>
+          <a:xfrm>
+            <a:off x="838200" y="2858847"/>
+            <a:ext cx="4407425" cy="369332"/>
+          </a:xfrm>
+          <a:prstGeom prst="rect">
+            <a:avLst/>
+          </a:prstGeom>
+          <a:noFill/>
+        </p:spPr>
+        <p:txBody>
+          <a:bodyPr wrap="none" rtlCol="0">
+            <a:spAutoFit/>
+          </a:bodyPr>
+          <a:lstStyle/>
+          <a:p>
+            <a:r>
+              <a:rPr lang="en-US" u="sng" dirty="0"/>
+              <a:t>Step 2: Get a noise distribution of cluster sizes</a:t>
+            </a:r>
+          </a:p>
+        </p:txBody>
+      </p:sp>
+      <p:sp>
+        <p:nvSpPr>
+          <p:cNvPr id="12" name="TextBox 11">
+            <a:extLst>
+              <a:ext uri="{FF2B5EF4-FFF2-40B4-BE49-F238E27FC236}">
+                <a16:creationId xmlns:a16="http://schemas.microsoft.com/office/drawing/2014/main" id="{7EDAAD23-CE27-43F7-8690-FD6D73FD395C}"/>
+              </a:ext>
+            </a:extLst>
+          </p:cNvPr>
+          <p:cNvSpPr txBox="1"/>
+          <p:nvPr/>
+        </p:nvSpPr>
+        <p:spPr>
+          <a:xfrm>
+            <a:off x="830083" y="4391753"/>
+            <a:ext cx="2811795" cy="369332"/>
+          </a:xfrm>
+          <a:prstGeom prst="rect">
+            <a:avLst/>
+          </a:prstGeom>
+          <a:noFill/>
+        </p:spPr>
+        <p:txBody>
+          <a:bodyPr wrap="none" rtlCol="0">
+            <a:spAutoFit/>
+          </a:bodyPr>
+          <a:lstStyle/>
+          <a:p>
+            <a:r>
+              <a:rPr lang="en-US" u="sng" dirty="0"/>
+              <a:t>Step 3: Keep the big clusters</a:t>
+            </a:r>
+          </a:p>
+        </p:txBody>
+      </p:sp>
+      <p:sp>
+        <p:nvSpPr>
+          <p:cNvPr id="13" name="TextBox 12">
+            <a:extLst>
+              <a:ext uri="{FF2B5EF4-FFF2-40B4-BE49-F238E27FC236}">
+                <a16:creationId xmlns:a16="http://schemas.microsoft.com/office/drawing/2014/main" id="{67B16D22-C728-4525-AB8B-8594BC7D5852}"/>
+              </a:ext>
+            </a:extLst>
+          </p:cNvPr>
+          <p:cNvSpPr txBox="1"/>
+          <p:nvPr/>
+        </p:nvSpPr>
+        <p:spPr>
+          <a:xfrm>
+            <a:off x="1103914" y="4761321"/>
+            <a:ext cx="7775147" cy="1200329"/>
+          </a:xfrm>
+          <a:prstGeom prst="rect">
+            <a:avLst/>
+          </a:prstGeom>
+          <a:noFill/>
+        </p:spPr>
+        <p:txBody>
+          <a:bodyPr wrap="square" rtlCol="0">
+            <a:spAutoFit/>
+          </a:bodyPr>
+          <a:lstStyle/>
+          <a:p>
+            <a:r>
+              <a:rPr lang="en-US" dirty="0"/>
+              <a:t>For each cluster in the </a:t>
+            </a:r>
+            <a:r>
+              <a:rPr lang="en-US" u="sng" dirty="0"/>
+              <a:t>intact data:</a:t>
+            </a:r>
+          </a:p>
+          <a:p>
+            <a:pPr marL="342900" indent="-342900">
+              <a:buAutoNum type="arabicPeriod"/>
+            </a:pPr>
+            <a:r>
+              <a:rPr lang="en-US" dirty="0"/>
+              <a:t>compare the </a:t>
+            </a:r>
+            <a:r>
+              <a:rPr lang="en-US" dirty="0">
+                <a:solidFill>
+                  <a:srgbClr val="FF0000"/>
+                </a:solidFill>
+              </a:rPr>
+              <a:t>cluster’s size </a:t>
+            </a:r>
+            <a:r>
+              <a:rPr lang="en-US" dirty="0"/>
+              <a:t>to the noise distribution</a:t>
+            </a:r>
+          </a:p>
+          <a:p>
+            <a:r>
+              <a:rPr lang="en-US" dirty="0"/>
+              <a:t>…If it’s larger than the mass of the distribution (using q &lt; 0.05) </a:t>
+            </a:r>
+            <a:r>
+              <a:rPr lang="en-US" dirty="0">
+                <a:sym typeface="Wingdings" panose="05000000000000000000" pitchFamily="2" charset="2"/>
+              </a:rPr>
+              <a:t> keep it</a:t>
+            </a:r>
+          </a:p>
+          <a:p>
+            <a:r>
+              <a:rPr lang="en-US" dirty="0">
+                <a:sym typeface="Wingdings" panose="05000000000000000000" pitchFamily="2" charset="2"/>
+              </a:rPr>
+              <a:t>…If not, mask it out</a:t>
+            </a:r>
+            <a:endParaRPr lang="en-US" dirty="0"/>
+          </a:p>
+        </p:txBody>
+      </p:sp>
+      <p:grpSp>
+        <p:nvGrpSpPr>
+          <p:cNvPr id="16" name="Group 15">
+            <a:extLst>
+              <a:ext uri="{FF2B5EF4-FFF2-40B4-BE49-F238E27FC236}">
+                <a16:creationId xmlns:a16="http://schemas.microsoft.com/office/drawing/2014/main" id="{149E7BEE-C327-41FF-BF2E-5AD0385354C8}"/>
+              </a:ext>
+            </a:extLst>
+          </p:cNvPr>
+          <p:cNvGrpSpPr/>
+          <p:nvPr/>
+        </p:nvGrpSpPr>
+        <p:grpSpPr>
+          <a:xfrm>
+            <a:off x="8350926" y="4138519"/>
+            <a:ext cx="2737160" cy="1495647"/>
+            <a:chOff x="837508" y="3435078"/>
+            <a:chExt cx="2737160" cy="1495647"/>
+          </a:xfrm>
+        </p:grpSpPr>
+        <p:cxnSp>
+          <p:nvCxnSpPr>
+            <p:cNvPr id="18" name="Straight Arrow Connector 17">
+              <a:extLst>
+                <a:ext uri="{FF2B5EF4-FFF2-40B4-BE49-F238E27FC236}">
+                  <a16:creationId xmlns:a16="http://schemas.microsoft.com/office/drawing/2014/main" id="{3D14D216-7AEF-459F-9C89-9C8B34165BD7}"/>
+                </a:ext>
+              </a:extLst>
+            </p:cNvPr>
+            <p:cNvCxnSpPr>
+              <a:cxnSpLocks/>
+            </p:cNvCxnSpPr>
+            <p:nvPr/>
+          </p:nvCxnSpPr>
+          <p:spPr>
+            <a:xfrm>
+              <a:off x="945334" y="4520726"/>
+              <a:ext cx="2521509" cy="0"/>
+            </a:xfrm>
+            <a:prstGeom prst="straightConnector1">
+              <a:avLst/>
+            </a:prstGeom>
+            <a:ln>
+              <a:tailEnd type="triangle"/>
+            </a:ln>
+          </p:spPr>
+          <p:style>
+            <a:lnRef idx="1">
+              <a:schemeClr val="dk1"/>
+            </a:lnRef>
+            <a:fillRef idx="0">
+              <a:schemeClr val="dk1"/>
+            </a:fillRef>
+            <a:effectRef idx="0">
+              <a:schemeClr val="dk1"/>
+            </a:effectRef>
+            <a:fontRef idx="minor">
+              <a:schemeClr val="tx1"/>
+            </a:fontRef>
+          </p:style>
+        </p:cxnSp>
+        <p:sp>
+          <p:nvSpPr>
+            <p:cNvPr id="19" name="TextBox 18">
+              <a:extLst>
+                <a:ext uri="{FF2B5EF4-FFF2-40B4-BE49-F238E27FC236}">
+                  <a16:creationId xmlns:a16="http://schemas.microsoft.com/office/drawing/2014/main" id="{1756CDAD-CB92-4257-B084-266D998AC8C4}"/>
+                </a:ext>
+              </a:extLst>
+            </p:cNvPr>
+            <p:cNvSpPr txBox="1"/>
+            <p:nvPr/>
+          </p:nvSpPr>
+          <p:spPr>
+            <a:xfrm>
+              <a:off x="837508" y="4561393"/>
+              <a:ext cx="2737160" cy="369332"/>
+            </a:xfrm>
+            <a:prstGeom prst="rect">
+              <a:avLst/>
+            </a:prstGeom>
+            <a:noFill/>
+          </p:spPr>
+          <p:txBody>
+            <a:bodyPr wrap="none" rtlCol="0">
+              <a:spAutoFit/>
+            </a:bodyPr>
+            <a:lstStyle/>
+            <a:p>
+              <a:r>
+                <a:rPr lang="en-US" i="1" dirty="0"/>
+                <a:t>Cluster size for shuffled data</a:t>
+              </a:r>
+            </a:p>
+          </p:txBody>
+        </p:sp>
+        <p:sp>
+          <p:nvSpPr>
+            <p:cNvPr id="20" name="Freeform: Shape 19">
+              <a:extLst>
+                <a:ext uri="{FF2B5EF4-FFF2-40B4-BE49-F238E27FC236}">
+                  <a16:creationId xmlns:a16="http://schemas.microsoft.com/office/drawing/2014/main" id="{8979FC8E-1979-401D-AADC-AC0EFA001C99}"/>
+                </a:ext>
+              </a:extLst>
+            </p:cNvPr>
+            <p:cNvSpPr/>
+            <p:nvPr/>
+          </p:nvSpPr>
+          <p:spPr>
+            <a:xfrm>
+              <a:off x="1008404" y="3435078"/>
+              <a:ext cx="1828800" cy="1068556"/>
+            </a:xfrm>
+            <a:custGeom>
+              <a:avLst/>
+              <a:gdLst>
+                <a:gd name="connsiteX0" fmla="*/ 0 w 1828800"/>
+                <a:gd name="connsiteY0" fmla="*/ 1068556 h 1068556"/>
+                <a:gd name="connsiteX1" fmla="*/ 264919 w 1828800"/>
+                <a:gd name="connsiteY1" fmla="*/ 948915 h 1068556"/>
+                <a:gd name="connsiteX2" fmla="*/ 461473 w 1828800"/>
+                <a:gd name="connsiteY2" fmla="*/ 632720 h 1068556"/>
+                <a:gd name="connsiteX3" fmla="*/ 529839 w 1828800"/>
+                <a:gd name="connsiteY3" fmla="*/ 188339 h 1068556"/>
+                <a:gd name="connsiteX4" fmla="*/ 752030 w 1828800"/>
+                <a:gd name="connsiteY4" fmla="*/ 331 h 1068556"/>
+                <a:gd name="connsiteX5" fmla="*/ 991312 w 1828800"/>
+                <a:gd name="connsiteY5" fmla="*/ 154156 h 1068556"/>
+                <a:gd name="connsiteX6" fmla="*/ 1145136 w 1828800"/>
+                <a:gd name="connsiteY6" fmla="*/ 547262 h 1068556"/>
+                <a:gd name="connsiteX7" fmla="*/ 1247686 w 1828800"/>
+                <a:gd name="connsiteY7" fmla="*/ 760907 h 1068556"/>
+                <a:gd name="connsiteX8" fmla="*/ 1375873 w 1828800"/>
+                <a:gd name="connsiteY8" fmla="*/ 948915 h 1068556"/>
+                <a:gd name="connsiteX9" fmla="*/ 1640792 w 1828800"/>
+                <a:gd name="connsiteY9" fmla="*/ 1042918 h 1068556"/>
+                <a:gd name="connsiteX10" fmla="*/ 1828800 w 1828800"/>
+                <a:gd name="connsiteY10" fmla="*/ 1060010 h 1068556"/>
+              </a:gdLst>
+              <a:ahLst/>
+              <a:cxnLst>
+                <a:cxn ang="0">
+                  <a:pos x="connsiteX0" y="connsiteY0"/>
+                </a:cxn>
+                <a:cxn ang="0">
+                  <a:pos x="connsiteX1" y="connsiteY1"/>
+                </a:cxn>
+                <a:cxn ang="0">
+                  <a:pos x="connsiteX2" y="connsiteY2"/>
+                </a:cxn>
+                <a:cxn ang="0">
+                  <a:pos x="connsiteX3" y="connsiteY3"/>
+                </a:cxn>
+                <a:cxn ang="0">
+                  <a:pos x="connsiteX4" y="connsiteY4"/>
+                </a:cxn>
+                <a:cxn ang="0">
+                  <a:pos x="connsiteX5" y="connsiteY5"/>
+                </a:cxn>
+                <a:cxn ang="0">
+                  <a:pos x="connsiteX6" y="connsiteY6"/>
+                </a:cxn>
+                <a:cxn ang="0">
+                  <a:pos x="connsiteX7" y="connsiteY7"/>
+                </a:cxn>
+                <a:cxn ang="0">
+                  <a:pos x="connsiteX8" y="connsiteY8"/>
+                </a:cxn>
+                <a:cxn ang="0">
+                  <a:pos x="connsiteX9" y="connsiteY9"/>
+                </a:cxn>
+                <a:cxn ang="0">
+                  <a:pos x="connsiteX10" y="connsiteY10"/>
+                </a:cxn>
+              </a:cxnLst>
+              <a:rect l="l" t="t" r="r" b="b"/>
+              <a:pathLst>
+                <a:path w="1828800" h="1068556">
+                  <a:moveTo>
+                    <a:pt x="0" y="1068556"/>
+                  </a:moveTo>
+                  <a:cubicBezTo>
+                    <a:pt x="94003" y="1045055"/>
+                    <a:pt x="188007" y="1021554"/>
+                    <a:pt x="264919" y="948915"/>
+                  </a:cubicBezTo>
+                  <a:cubicBezTo>
+                    <a:pt x="341831" y="876276"/>
+                    <a:pt x="417320" y="759483"/>
+                    <a:pt x="461473" y="632720"/>
+                  </a:cubicBezTo>
+                  <a:cubicBezTo>
+                    <a:pt x="505626" y="505957"/>
+                    <a:pt x="481413" y="293737"/>
+                    <a:pt x="529839" y="188339"/>
+                  </a:cubicBezTo>
+                  <a:cubicBezTo>
+                    <a:pt x="578265" y="82941"/>
+                    <a:pt x="675118" y="6028"/>
+                    <a:pt x="752030" y="331"/>
+                  </a:cubicBezTo>
+                  <a:cubicBezTo>
+                    <a:pt x="828942" y="-5366"/>
+                    <a:pt x="925794" y="63001"/>
+                    <a:pt x="991312" y="154156"/>
+                  </a:cubicBezTo>
+                  <a:cubicBezTo>
+                    <a:pt x="1056830" y="245311"/>
+                    <a:pt x="1102407" y="446137"/>
+                    <a:pt x="1145136" y="547262"/>
+                  </a:cubicBezTo>
+                  <a:cubicBezTo>
+                    <a:pt x="1187865" y="648387"/>
+                    <a:pt x="1209230" y="693965"/>
+                    <a:pt x="1247686" y="760907"/>
+                  </a:cubicBezTo>
+                  <a:cubicBezTo>
+                    <a:pt x="1286142" y="827849"/>
+                    <a:pt x="1310355" y="901913"/>
+                    <a:pt x="1375873" y="948915"/>
+                  </a:cubicBezTo>
+                  <a:cubicBezTo>
+                    <a:pt x="1441391" y="995917"/>
+                    <a:pt x="1565304" y="1024402"/>
+                    <a:pt x="1640792" y="1042918"/>
+                  </a:cubicBezTo>
+                  <a:cubicBezTo>
+                    <a:pt x="1716280" y="1061434"/>
+                    <a:pt x="1772540" y="1060722"/>
+                    <a:pt x="1828800" y="1060010"/>
+                  </a:cubicBezTo>
+                </a:path>
+              </a:pathLst>
+            </a:custGeom>
+            <a:solidFill>
+              <a:schemeClr val="accent5">
+                <a:lumMod val="40000"/>
+                <a:lumOff val="60000"/>
+              </a:schemeClr>
+            </a:solidFill>
+          </p:spPr>
+          <p:style>
+            <a:lnRef idx="2">
+              <a:schemeClr val="accent1">
+                <a:shade val="50000"/>
+              </a:schemeClr>
+            </a:lnRef>
+            <a:fillRef idx="1">
+              <a:schemeClr val="accent1"/>
+            </a:fillRef>
+            <a:effectRef idx="0">
+              <a:schemeClr val="accent1"/>
+            </a:effectRef>
+            <a:fontRef idx="minor">
+              <a:schemeClr val="lt1"/>
+            </a:fontRef>
+          </p:style>
+          <p:txBody>
+            <a:bodyPr rtlCol="0" anchor="ctr"/>
+            <a:lstStyle/>
+            <a:p>
+              <a:pPr algn="ctr"/>
+              <a:endParaRPr lang="en-US"/>
+            </a:p>
+          </p:txBody>
+        </p:sp>
+      </p:grpSp>
+      <p:cxnSp>
+        <p:nvCxnSpPr>
+          <p:cNvPr id="17" name="Straight Connector 16">
+            <a:extLst>
+              <a:ext uri="{FF2B5EF4-FFF2-40B4-BE49-F238E27FC236}">
+                <a16:creationId xmlns:a16="http://schemas.microsoft.com/office/drawing/2014/main" id="{9FA231BA-469F-4308-8644-E620A12558A8}"/>
+              </a:ext>
+            </a:extLst>
+          </p:cNvPr>
+          <p:cNvCxnSpPr/>
+          <p:nvPr/>
+        </p:nvCxnSpPr>
+        <p:spPr>
+          <a:xfrm>
+            <a:off x="9881877" y="4000340"/>
+            <a:ext cx="0" cy="1188720"/>
+          </a:xfrm>
+          <a:prstGeom prst="line">
+            <a:avLst/>
+          </a:prstGeom>
+          <a:ln>
+            <a:solidFill>
+              <a:srgbClr val="FF0000"/>
+            </a:solidFill>
+            <a:prstDash val="lgDash"/>
+          </a:ln>
+        </p:spPr>
+        <p:style>
+          <a:lnRef idx="1">
+            <a:schemeClr val="accent1"/>
+          </a:lnRef>
+          <a:fillRef idx="0">
+            <a:schemeClr val="accent1"/>
+          </a:fillRef>
+          <a:effectRef idx="0">
+            <a:schemeClr val="accent1"/>
+          </a:effectRef>
+          <a:fontRef idx="minor">
+            <a:schemeClr val="tx1"/>
+          </a:fontRef>
+        </p:style>
+      </p:cxnSp>
+      <p:sp>
+        <p:nvSpPr>
+          <p:cNvPr id="22" name="TextBox 21">
+            <a:extLst>
+              <a:ext uri="{FF2B5EF4-FFF2-40B4-BE49-F238E27FC236}">
+                <a16:creationId xmlns:a16="http://schemas.microsoft.com/office/drawing/2014/main" id="{EB447FD8-7962-4DD9-BC53-0D22E94A55B3}"/>
+              </a:ext>
+            </a:extLst>
+          </p:cNvPr>
+          <p:cNvSpPr txBox="1"/>
+          <p:nvPr/>
+        </p:nvSpPr>
+        <p:spPr>
+          <a:xfrm>
+            <a:off x="838200" y="2283474"/>
+            <a:ext cx="5303631" cy="369332"/>
+          </a:xfrm>
+          <a:prstGeom prst="rect">
+            <a:avLst/>
+          </a:prstGeom>
+          <a:noFill/>
+        </p:spPr>
+        <p:txBody>
+          <a:bodyPr wrap="none" rtlCol="0">
+            <a:spAutoFit/>
+          </a:bodyPr>
+          <a:lstStyle/>
+          <a:p>
+            <a:r>
+              <a:rPr lang="en-US" u="sng" dirty="0"/>
+              <a:t>Step 1: Identify the clusters in the voxel-corrected results</a:t>
+            </a:r>
+          </a:p>
+        </p:txBody>
+      </p:sp>
+      <p:sp>
+        <p:nvSpPr>
+          <p:cNvPr id="23" name="Freeform: Shape 22">
+            <a:extLst>
+              <a:ext uri="{FF2B5EF4-FFF2-40B4-BE49-F238E27FC236}">
+                <a16:creationId xmlns:a16="http://schemas.microsoft.com/office/drawing/2014/main" id="{B90FAF3C-8BD3-43BD-8A0B-2FB7B146DA58}"/>
+              </a:ext>
+            </a:extLst>
+          </p:cNvPr>
+          <p:cNvSpPr/>
+          <p:nvPr/>
+        </p:nvSpPr>
+        <p:spPr>
+          <a:xfrm>
+            <a:off x="758703" y="4781659"/>
+            <a:ext cx="333164" cy="374251"/>
+          </a:xfrm>
+          <a:custGeom>
+            <a:avLst/>
+            <a:gdLst>
+              <a:gd name="connsiteX0" fmla="*/ 99899 w 749186"/>
+              <a:gd name="connsiteY0" fmla="*/ 332403 h 700253"/>
+              <a:gd name="connsiteX1" fmla="*/ 379817 w 749186"/>
+              <a:gd name="connsiteY1" fmla="*/ 52485 h 700253"/>
+              <a:gd name="connsiteX2" fmla="*/ 575760 w 749186"/>
+              <a:gd name="connsiteY2" fmla="*/ 24493 h 700253"/>
+              <a:gd name="connsiteX3" fmla="*/ 557099 w 749186"/>
+              <a:gd name="connsiteY3" fmla="*/ 323072 h 700253"/>
+              <a:gd name="connsiteX4" fmla="*/ 743711 w 749186"/>
+              <a:gd name="connsiteY4" fmla="*/ 425709 h 700253"/>
+              <a:gd name="connsiteX5" fmla="*/ 687727 w 749186"/>
+              <a:gd name="connsiteY5" fmla="*/ 677636 h 700253"/>
+              <a:gd name="connsiteX6" fmla="*/ 566429 w 749186"/>
+              <a:gd name="connsiteY6" fmla="*/ 677636 h 700253"/>
+              <a:gd name="connsiteX7" fmla="*/ 417139 w 749186"/>
+              <a:gd name="connsiteY7" fmla="*/ 584330 h 700253"/>
+              <a:gd name="connsiteX8" fmla="*/ 239858 w 749186"/>
+              <a:gd name="connsiteY8" fmla="*/ 640313 h 700253"/>
+              <a:gd name="connsiteX9" fmla="*/ 6592 w 749186"/>
+              <a:gd name="connsiteY9" fmla="*/ 649644 h 700253"/>
+              <a:gd name="connsiteX10" fmla="*/ 99899 w 749186"/>
+              <a:gd name="connsiteY10" fmla="*/ 332403 h 700253"/>
+            </a:gdLst>
+            <a:ahLst/>
+            <a:cxnLst>
+              <a:cxn ang="0">
+                <a:pos x="connsiteX0" y="connsiteY0"/>
+              </a:cxn>
+              <a:cxn ang="0">
+                <a:pos x="connsiteX1" y="connsiteY1"/>
+              </a:cxn>
+              <a:cxn ang="0">
+                <a:pos x="connsiteX2" y="connsiteY2"/>
+              </a:cxn>
+              <a:cxn ang="0">
+                <a:pos x="connsiteX3" y="connsiteY3"/>
+              </a:cxn>
+              <a:cxn ang="0">
+                <a:pos x="connsiteX4" y="connsiteY4"/>
+              </a:cxn>
+              <a:cxn ang="0">
+                <a:pos x="connsiteX5" y="connsiteY5"/>
+              </a:cxn>
+              <a:cxn ang="0">
+                <a:pos x="connsiteX6" y="connsiteY6"/>
+              </a:cxn>
+              <a:cxn ang="0">
+                <a:pos x="connsiteX7" y="connsiteY7"/>
+              </a:cxn>
+              <a:cxn ang="0">
+                <a:pos x="connsiteX8" y="connsiteY8"/>
+              </a:cxn>
+              <a:cxn ang="0">
+                <a:pos x="connsiteX9" y="connsiteY9"/>
+              </a:cxn>
+              <a:cxn ang="0">
+                <a:pos x="connsiteX10" y="connsiteY10"/>
+              </a:cxn>
+            </a:cxnLst>
+            <a:rect l="l" t="t" r="r" b="b"/>
+            <a:pathLst>
+              <a:path w="749186" h="700253">
+                <a:moveTo>
+                  <a:pt x="99899" y="332403"/>
+                </a:moveTo>
+                <a:cubicBezTo>
+                  <a:pt x="162103" y="232877"/>
+                  <a:pt x="300507" y="103803"/>
+                  <a:pt x="379817" y="52485"/>
+                </a:cubicBezTo>
+                <a:cubicBezTo>
+                  <a:pt x="459127" y="1167"/>
+                  <a:pt x="546213" y="-20605"/>
+                  <a:pt x="575760" y="24493"/>
+                </a:cubicBezTo>
+                <a:cubicBezTo>
+                  <a:pt x="605307" y="69591"/>
+                  <a:pt x="529107" y="256203"/>
+                  <a:pt x="557099" y="323072"/>
+                </a:cubicBezTo>
+                <a:cubicBezTo>
+                  <a:pt x="585091" y="389941"/>
+                  <a:pt x="721940" y="366615"/>
+                  <a:pt x="743711" y="425709"/>
+                </a:cubicBezTo>
+                <a:cubicBezTo>
+                  <a:pt x="765482" y="484803"/>
+                  <a:pt x="717274" y="635648"/>
+                  <a:pt x="687727" y="677636"/>
+                </a:cubicBezTo>
+                <a:cubicBezTo>
+                  <a:pt x="658180" y="719624"/>
+                  <a:pt x="611527" y="693187"/>
+                  <a:pt x="566429" y="677636"/>
+                </a:cubicBezTo>
+                <a:cubicBezTo>
+                  <a:pt x="521331" y="662085"/>
+                  <a:pt x="471567" y="590550"/>
+                  <a:pt x="417139" y="584330"/>
+                </a:cubicBezTo>
+                <a:cubicBezTo>
+                  <a:pt x="362711" y="578110"/>
+                  <a:pt x="308282" y="629427"/>
+                  <a:pt x="239858" y="640313"/>
+                </a:cubicBezTo>
+                <a:cubicBezTo>
+                  <a:pt x="171434" y="651199"/>
+                  <a:pt x="33029" y="696297"/>
+                  <a:pt x="6592" y="649644"/>
+                </a:cubicBezTo>
+                <a:cubicBezTo>
+                  <a:pt x="-19845" y="602991"/>
+                  <a:pt x="37695" y="431929"/>
+                  <a:pt x="99899" y="332403"/>
+                </a:cubicBezTo>
+                <a:close/>
+              </a:path>
+            </a:pathLst>
+          </a:custGeom>
+          <a:solidFill>
+            <a:schemeClr val="bg1">
+              <a:lumMod val="85000"/>
+            </a:schemeClr>
+          </a:solidFill>
+          <a:ln>
+            <a:solidFill>
+              <a:schemeClr val="tx1"/>
+            </a:solidFill>
+          </a:ln>
+        </p:spPr>
+        <p:style>
+          <a:lnRef idx="2">
+            <a:schemeClr val="accent1">
+              <a:shade val="50000"/>
+            </a:schemeClr>
+          </a:lnRef>
+          <a:fillRef idx="1">
+            <a:schemeClr val="accent1"/>
+          </a:fillRef>
+          <a:effectRef idx="0">
+            <a:schemeClr val="accent1"/>
+          </a:effectRef>
+          <a:fontRef idx="minor">
+            <a:schemeClr val="lt1"/>
+          </a:fontRef>
+        </p:style>
+        <p:txBody>
+          <a:bodyPr rtlCol="0" anchor="ctr"/>
+          <a:lstStyle/>
+          <a:p>
+            <a:pPr algn="ctr"/>
+            <a:endParaRPr lang="en-US"/>
+          </a:p>
+        </p:txBody>
+      </p:sp>
+    </p:spTree>
+    <p:extLst>
+      <p:ext uri="{BB962C8B-B14F-4D97-AF65-F5344CB8AC3E}">
+        <p14:creationId xmlns:p14="http://schemas.microsoft.com/office/powerpoint/2010/main" val="303285910"/>
+      </p:ext>
+    </p:extLst>
+  </p:cSld>
+  <p:clrMapOvr>
+    <a:masterClrMapping/>
+  </p:clrMapOvr>
+</p:sld>
+</file>
+
+<file path=ppt/slides/slide13.xml><?xml version="1.0" encoding="utf-8"?>
+<p:sld xmlns:a="http://schemas.openxmlformats.org/drawingml/2006/main" xmlns:r="http://schemas.openxmlformats.org/officeDocument/2006/relationships" xmlns:p="http://schemas.openxmlformats.org/presentationml/2006/main">
+  <p:cSld>
+    <p:spTree>
+      <p:nvGrpSpPr>
+        <p:cNvPr id="1" name=""/>
+        <p:cNvGrpSpPr/>
+        <p:nvPr/>
+      </p:nvGrpSpPr>
+      <p:grpSpPr>
+        <a:xfrm>
+          <a:off x="0" y="0"/>
+          <a:ext cx="0" cy="0"/>
+          <a:chOff x="0" y="0"/>
+          <a:chExt cx="0" cy="0"/>
+        </a:xfrm>
+      </p:grpSpPr>
+      <p:sp>
+        <p:nvSpPr>
+          <p:cNvPr id="2" name="Title 1">
+            <a:extLst>
+              <a:ext uri="{FF2B5EF4-FFF2-40B4-BE49-F238E27FC236}">
+                <a16:creationId xmlns:a16="http://schemas.microsoft.com/office/drawing/2014/main" id="{5D69A2B6-311B-4BDD-A367-11159A4695EA}"/>
+              </a:ext>
+            </a:extLst>
+          </p:cNvPr>
+          <p:cNvSpPr>
+            <a:spLocks noGrp="1"/>
+          </p:cNvSpPr>
+          <p:nvPr>
+            <p:ph type="title"/>
+          </p:nvPr>
+        </p:nvSpPr>
+        <p:spPr/>
+        <p:txBody>
+          <a:bodyPr/>
+          <a:lstStyle/>
+          <a:p>
+            <a:r>
+              <a:rPr lang="en-US" dirty="0"/>
+              <a:t>Identifying the clusters</a:t>
+            </a:r>
+          </a:p>
+        </p:txBody>
+      </p:sp>
+      <p:pic>
+        <p:nvPicPr>
+          <p:cNvPr id="5" name="Picture 4">
+            <a:extLst>
+              <a:ext uri="{FF2B5EF4-FFF2-40B4-BE49-F238E27FC236}">
+                <a16:creationId xmlns:a16="http://schemas.microsoft.com/office/drawing/2014/main" id="{9E80903D-CBF7-46C6-B3EB-B290AB46D64A}"/>
+              </a:ext>
+            </a:extLst>
+          </p:cNvPr>
+          <p:cNvPicPr>
+            <a:picLocks noChangeAspect="1"/>
+          </p:cNvPicPr>
+          <p:nvPr/>
+        </p:nvPicPr>
+        <p:blipFill>
+          <a:blip r:embed="rId2"/>
+          <a:stretch>
+            <a:fillRect/>
+          </a:stretch>
+        </p:blipFill>
+        <p:spPr>
+          <a:xfrm>
+            <a:off x="6885806" y="1001946"/>
+            <a:ext cx="2123185" cy="3861633"/>
+          </a:xfrm>
+          <a:prstGeom prst="rect">
+            <a:avLst/>
+          </a:prstGeom>
+        </p:spPr>
+      </p:pic>
+      <p:cxnSp>
+        <p:nvCxnSpPr>
+          <p:cNvPr id="7" name="Straight Arrow Connector 6">
+            <a:extLst>
+              <a:ext uri="{FF2B5EF4-FFF2-40B4-BE49-F238E27FC236}">
+                <a16:creationId xmlns:a16="http://schemas.microsoft.com/office/drawing/2014/main" id="{50621D53-7390-45C9-8B15-692DD2E37676}"/>
+              </a:ext>
+            </a:extLst>
+          </p:cNvPr>
+          <p:cNvCxnSpPr>
+            <a:cxnSpLocks/>
+          </p:cNvCxnSpPr>
+          <p:nvPr/>
+        </p:nvCxnSpPr>
+        <p:spPr>
+          <a:xfrm flipV="1">
+            <a:off x="9100983" y="2768830"/>
+            <a:ext cx="457200" cy="0"/>
+          </a:xfrm>
+          <a:prstGeom prst="straightConnector1">
+            <a:avLst/>
+          </a:prstGeom>
+          <a:ln w="28575">
+            <a:tailEnd type="triangle"/>
+          </a:ln>
+        </p:spPr>
+        <p:style>
+          <a:lnRef idx="1">
+            <a:schemeClr val="dk1"/>
+          </a:lnRef>
+          <a:fillRef idx="0">
+            <a:schemeClr val="dk1"/>
+          </a:fillRef>
+          <a:effectRef idx="0">
+            <a:schemeClr val="dk1"/>
+          </a:effectRef>
+          <a:fontRef idx="minor">
+            <a:schemeClr val="tx1"/>
+          </a:fontRef>
+        </p:style>
+      </p:cxnSp>
+      <p:sp>
+        <p:nvSpPr>
+          <p:cNvPr id="8" name="TextBox 7">
+            <a:extLst>
+              <a:ext uri="{FF2B5EF4-FFF2-40B4-BE49-F238E27FC236}">
+                <a16:creationId xmlns:a16="http://schemas.microsoft.com/office/drawing/2014/main" id="{6B9AB97C-AC11-4482-BCD6-57CD2BE45FAD}"/>
+              </a:ext>
+            </a:extLst>
+          </p:cNvPr>
+          <p:cNvSpPr txBox="1"/>
+          <p:nvPr/>
+        </p:nvSpPr>
+        <p:spPr>
+          <a:xfrm>
+            <a:off x="261601" y="1764629"/>
+            <a:ext cx="5186298" cy="646331"/>
+          </a:xfrm>
+          <a:prstGeom prst="rect">
+            <a:avLst/>
+          </a:prstGeom>
+          <a:noFill/>
+        </p:spPr>
+        <p:txBody>
+          <a:bodyPr wrap="square" rtlCol="0">
+            <a:spAutoFit/>
+          </a:bodyPr>
+          <a:lstStyle/>
+          <a:p>
+            <a:r>
+              <a:rPr lang="en-US" dirty="0"/>
+              <a:t>Cluster the voxels using Density-Based Spatial Clustering of Applications with Noise (DBSCAN)</a:t>
+            </a:r>
+          </a:p>
+        </p:txBody>
+      </p:sp>
+      <p:pic>
+        <p:nvPicPr>
+          <p:cNvPr id="13" name="Picture 12">
+            <a:extLst>
+              <a:ext uri="{FF2B5EF4-FFF2-40B4-BE49-F238E27FC236}">
+                <a16:creationId xmlns:a16="http://schemas.microsoft.com/office/drawing/2014/main" id="{2E392177-2588-4B8F-9C13-CC4DED02BA5E}"/>
+              </a:ext>
+            </a:extLst>
+          </p:cNvPr>
+          <p:cNvPicPr>
+            <a:picLocks noChangeAspect="1"/>
+          </p:cNvPicPr>
+          <p:nvPr/>
+        </p:nvPicPr>
+        <p:blipFill>
+          <a:blip r:embed="rId3"/>
+          <a:stretch>
+            <a:fillRect/>
+          </a:stretch>
+        </p:blipFill>
+        <p:spPr>
+          <a:xfrm>
+            <a:off x="9650175" y="1001954"/>
+            <a:ext cx="2137015" cy="3861625"/>
+          </a:xfrm>
+          <a:prstGeom prst="rect">
+            <a:avLst/>
+          </a:prstGeom>
+        </p:spPr>
+      </p:pic>
+      <p:sp>
+        <p:nvSpPr>
+          <p:cNvPr id="19" name="TextBox 18">
+            <a:extLst>
+              <a:ext uri="{FF2B5EF4-FFF2-40B4-BE49-F238E27FC236}">
+                <a16:creationId xmlns:a16="http://schemas.microsoft.com/office/drawing/2014/main" id="{F0B85E3A-32C7-496D-8E75-3DD887E7749B}"/>
+              </a:ext>
+            </a:extLst>
+          </p:cNvPr>
+          <p:cNvSpPr txBox="1"/>
+          <p:nvPr/>
+        </p:nvSpPr>
+        <p:spPr>
+          <a:xfrm>
+            <a:off x="261601" y="2605201"/>
+            <a:ext cx="4486549" cy="646331"/>
+          </a:xfrm>
+          <a:prstGeom prst="rect">
+            <a:avLst/>
+          </a:prstGeom>
+          <a:noFill/>
+        </p:spPr>
+        <p:txBody>
+          <a:bodyPr wrap="none" rtlCol="0">
+            <a:spAutoFit/>
+          </a:bodyPr>
+          <a:lstStyle/>
+          <a:p>
+            <a:r>
+              <a:rPr lang="en-US" u="sng" dirty="0"/>
+              <a:t>Inputs:</a:t>
+            </a:r>
+          </a:p>
+          <a:p>
+            <a:pPr marL="285750" indent="-285750">
+              <a:buFontTx/>
+              <a:buChar char="-"/>
+            </a:pPr>
+            <a:r>
+              <a:rPr lang="en-US" dirty="0"/>
+              <a:t>Distance matrix* or matrix of 3d coordinates</a:t>
+            </a:r>
+          </a:p>
+        </p:txBody>
+      </p:sp>
+      <p:pic>
+        <p:nvPicPr>
+          <p:cNvPr id="42" name="Picture 41">
+            <a:extLst>
+              <a:ext uri="{FF2B5EF4-FFF2-40B4-BE49-F238E27FC236}">
+                <a16:creationId xmlns:a16="http://schemas.microsoft.com/office/drawing/2014/main" id="{A136B2EA-CB98-41C9-A531-D000BCBD571D}"/>
+              </a:ext>
+            </a:extLst>
+          </p:cNvPr>
+          <p:cNvPicPr>
+            <a:picLocks noChangeAspect="1"/>
+          </p:cNvPicPr>
+          <p:nvPr/>
+        </p:nvPicPr>
+        <p:blipFill>
+          <a:blip r:embed="rId4"/>
+          <a:stretch>
+            <a:fillRect/>
+          </a:stretch>
+        </p:blipFill>
+        <p:spPr>
+          <a:xfrm>
+            <a:off x="404810" y="3260863"/>
+            <a:ext cx="1294117" cy="1214695"/>
+          </a:xfrm>
+          <a:prstGeom prst="rect">
+            <a:avLst/>
+          </a:prstGeom>
+        </p:spPr>
+      </p:pic>
+      <p:sp>
+        <p:nvSpPr>
+          <p:cNvPr id="43" name="TextBox 42">
+            <a:extLst>
+              <a:ext uri="{FF2B5EF4-FFF2-40B4-BE49-F238E27FC236}">
+                <a16:creationId xmlns:a16="http://schemas.microsoft.com/office/drawing/2014/main" id="{D9C984CB-37DE-4717-A33B-4467758FB291}"/>
+              </a:ext>
+            </a:extLst>
+          </p:cNvPr>
+          <p:cNvSpPr txBox="1"/>
+          <p:nvPr/>
+        </p:nvSpPr>
+        <p:spPr>
+          <a:xfrm>
+            <a:off x="2030162" y="3083695"/>
+            <a:ext cx="2717988" cy="276999"/>
+          </a:xfrm>
+          <a:prstGeom prst="rect">
+            <a:avLst/>
+          </a:prstGeom>
+          <a:noFill/>
+        </p:spPr>
+        <p:txBody>
+          <a:bodyPr wrap="none" rtlCol="0">
+            <a:spAutoFit/>
+          </a:bodyPr>
+          <a:lstStyle/>
+          <a:p>
+            <a:r>
+              <a:rPr lang="en-US" sz="1200" dirty="0"/>
+              <a:t>*</a:t>
+            </a:r>
+            <a:r>
+              <a:rPr lang="en-US" sz="1200" dirty="0">
+                <a:solidFill>
+                  <a:srgbClr val="00B050"/>
+                </a:solidFill>
+              </a:rPr>
+              <a:t>I found the distance matrix worked better</a:t>
+            </a:r>
+          </a:p>
+        </p:txBody>
+      </p:sp>
+      <p:sp>
+        <p:nvSpPr>
+          <p:cNvPr id="45" name="TextBox 44">
+            <a:extLst>
+              <a:ext uri="{FF2B5EF4-FFF2-40B4-BE49-F238E27FC236}">
+                <a16:creationId xmlns:a16="http://schemas.microsoft.com/office/drawing/2014/main" id="{32FF5DE1-CF68-454D-87DC-AF00FB64CE7C}"/>
+              </a:ext>
+            </a:extLst>
+          </p:cNvPr>
+          <p:cNvSpPr txBox="1"/>
+          <p:nvPr/>
+        </p:nvSpPr>
+        <p:spPr>
+          <a:xfrm>
+            <a:off x="229793" y="4699950"/>
+            <a:ext cx="6001144" cy="2031325"/>
+          </a:xfrm>
+          <a:prstGeom prst="rect">
+            <a:avLst/>
+          </a:prstGeom>
+          <a:noFill/>
+        </p:spPr>
+        <p:txBody>
+          <a:bodyPr wrap="square" rtlCol="0">
+            <a:spAutoFit/>
+          </a:bodyPr>
+          <a:lstStyle/>
+          <a:p>
+            <a:pPr marL="285750" indent="-285750">
+              <a:buFontTx/>
+              <a:buChar char="-"/>
+            </a:pPr>
+            <a:r>
+              <a:rPr lang="en-US" b="1" dirty="0"/>
+              <a:t>Epsilon:</a:t>
+            </a:r>
+            <a:r>
+              <a:rPr lang="en-US" dirty="0"/>
+              <a:t> neighborhood that </a:t>
+            </a:r>
+            <a:r>
+              <a:rPr lang="en-US" dirty="0" err="1"/>
+              <a:t>dbscan</a:t>
+            </a:r>
+            <a:r>
+              <a:rPr lang="en-US" dirty="0"/>
+              <a:t> looks in around a voxel </a:t>
+            </a:r>
+            <a:r>
+              <a:rPr lang="en-US" dirty="0">
+                <a:sym typeface="Wingdings" panose="05000000000000000000" pitchFamily="2" charset="2"/>
+              </a:rPr>
+              <a:t> if there are enough other voxels in that neighborhood, it counts it as a “core” point and will try to build a cluster around it</a:t>
+            </a:r>
+            <a:r>
+              <a:rPr lang="en-US" dirty="0"/>
+              <a:t> </a:t>
+            </a:r>
+            <a:r>
+              <a:rPr lang="en-US" dirty="0">
+                <a:sym typeface="Wingdings" panose="05000000000000000000" pitchFamily="2" charset="2"/>
+              </a:rPr>
+              <a:t> </a:t>
+            </a:r>
+            <a:r>
+              <a:rPr lang="en-US" b="1" dirty="0">
+                <a:solidFill>
+                  <a:srgbClr val="00B050"/>
+                </a:solidFill>
+                <a:sym typeface="Wingdings" panose="05000000000000000000" pitchFamily="2" charset="2"/>
+              </a:rPr>
+              <a:t>I ended up setting to 3</a:t>
+            </a:r>
+          </a:p>
+          <a:p>
+            <a:endParaRPr lang="en-US" b="1" dirty="0">
+              <a:solidFill>
+                <a:srgbClr val="00B050"/>
+              </a:solidFill>
+            </a:endParaRPr>
+          </a:p>
+          <a:p>
+            <a:pPr marL="285750" indent="-285750">
+              <a:buFontTx/>
+              <a:buChar char="-"/>
+            </a:pPr>
+            <a:r>
+              <a:rPr lang="en-US" b="1" dirty="0" err="1"/>
+              <a:t>Minpts</a:t>
+            </a:r>
+            <a:r>
+              <a:rPr lang="en-US" b="1" dirty="0"/>
+              <a:t>:</a:t>
+            </a:r>
+            <a:r>
+              <a:rPr lang="en-US" dirty="0"/>
+              <a:t> min # of voxels in a voxel’s epsilon neighborhood for it to count as a core point </a:t>
+            </a:r>
+            <a:r>
+              <a:rPr lang="en-US" dirty="0">
+                <a:sym typeface="Wingdings" panose="05000000000000000000" pitchFamily="2" charset="2"/>
+              </a:rPr>
+              <a:t> </a:t>
+            </a:r>
+            <a:r>
+              <a:rPr lang="en-US" b="1" dirty="0">
+                <a:solidFill>
+                  <a:srgbClr val="00B050"/>
+                </a:solidFill>
+                <a:sym typeface="Wingdings" panose="05000000000000000000" pitchFamily="2" charset="2"/>
+              </a:rPr>
+              <a:t>I used 1</a:t>
+            </a:r>
+            <a:endParaRPr lang="en-US" b="1" dirty="0">
+              <a:solidFill>
+                <a:srgbClr val="00B050"/>
+              </a:solidFill>
+            </a:endParaRPr>
+          </a:p>
+        </p:txBody>
+      </p:sp>
+      <p:sp>
+        <p:nvSpPr>
+          <p:cNvPr id="4" name="TextBox 3">
+            <a:extLst>
+              <a:ext uri="{FF2B5EF4-FFF2-40B4-BE49-F238E27FC236}">
+                <a16:creationId xmlns:a16="http://schemas.microsoft.com/office/drawing/2014/main" id="{1E2725CE-81B2-48FC-8880-C76029286EE7}"/>
+              </a:ext>
+            </a:extLst>
+          </p:cNvPr>
+          <p:cNvSpPr txBox="1"/>
+          <p:nvPr/>
+        </p:nvSpPr>
+        <p:spPr>
+          <a:xfrm>
+            <a:off x="6770144" y="4932724"/>
+            <a:ext cx="2330839" cy="1200329"/>
+          </a:xfrm>
+          <a:prstGeom prst="rect">
+            <a:avLst/>
+          </a:prstGeom>
+          <a:noFill/>
+        </p:spPr>
+        <p:txBody>
+          <a:bodyPr wrap="square" rtlCol="0">
+            <a:spAutoFit/>
+          </a:bodyPr>
+          <a:lstStyle/>
+          <a:p>
+            <a:pPr algn="ctr"/>
+            <a:r>
+              <a:rPr lang="en-US" dirty="0"/>
+              <a:t>Example RSA map after voxel-level corrections (black lines = reliable voxels)</a:t>
+            </a:r>
+          </a:p>
+        </p:txBody>
+      </p:sp>
+      <p:sp>
+        <p:nvSpPr>
+          <p:cNvPr id="6" name="TextBox 5">
+            <a:extLst>
+              <a:ext uri="{FF2B5EF4-FFF2-40B4-BE49-F238E27FC236}">
+                <a16:creationId xmlns:a16="http://schemas.microsoft.com/office/drawing/2014/main" id="{6B62E434-AF06-4D28-B0F4-53BA2C1E0CBC}"/>
+              </a:ext>
+            </a:extLst>
+          </p:cNvPr>
+          <p:cNvSpPr txBox="1"/>
+          <p:nvPr/>
+        </p:nvSpPr>
+        <p:spPr>
+          <a:xfrm>
+            <a:off x="9558184" y="4932724"/>
+            <a:ext cx="2229006" cy="923330"/>
+          </a:xfrm>
+          <a:prstGeom prst="rect">
+            <a:avLst/>
+          </a:prstGeom>
+          <a:noFill/>
+        </p:spPr>
+        <p:txBody>
+          <a:bodyPr wrap="square" rtlCol="0">
+            <a:spAutoFit/>
+          </a:bodyPr>
+          <a:lstStyle/>
+          <a:p>
+            <a:pPr algn="ctr"/>
+            <a:r>
+              <a:rPr lang="en-US" dirty="0"/>
+              <a:t>Surviving voxels grouped into clusters using </a:t>
+            </a:r>
+            <a:r>
+              <a:rPr lang="en-US" dirty="0" err="1"/>
+              <a:t>dbscan</a:t>
+            </a:r>
+            <a:endParaRPr lang="en-US" dirty="0"/>
+          </a:p>
+        </p:txBody>
+      </p:sp>
+    </p:spTree>
+    <p:extLst>
+      <p:ext uri="{BB962C8B-B14F-4D97-AF65-F5344CB8AC3E}">
+        <p14:creationId xmlns:p14="http://schemas.microsoft.com/office/powerpoint/2010/main" val="1414009599"/>
+      </p:ext>
+    </p:extLst>
+  </p:cSld>
+  <p:clrMapOvr>
+    <a:masterClrMapping/>
+  </p:clrMapOvr>
+</p:sld>
+</file>
+
+<file path=ppt/slides/slide14.xml><?xml version="1.0" encoding="utf-8"?>
+<p:sld xmlns:a="http://schemas.openxmlformats.org/drawingml/2006/main" xmlns:r="http://schemas.openxmlformats.org/officeDocument/2006/relationships" xmlns:p="http://schemas.openxmlformats.org/presentationml/2006/main">
+  <p:cSld>
+    <p:spTree>
+      <p:nvGrpSpPr>
+        <p:cNvPr id="1" name=""/>
+        <p:cNvGrpSpPr/>
+        <p:nvPr/>
+      </p:nvGrpSpPr>
+      <p:grpSpPr>
+        <a:xfrm>
+          <a:off x="0" y="0"/>
+          <a:ext cx="0" cy="0"/>
+          <a:chOff x="0" y="0"/>
+          <a:chExt cx="0" cy="0"/>
+        </a:xfrm>
+      </p:grpSpPr>
+      <p:sp>
+        <p:nvSpPr>
+          <p:cNvPr id="2" name="Title 1">
+            <a:extLst>
+              <a:ext uri="{FF2B5EF4-FFF2-40B4-BE49-F238E27FC236}">
+                <a16:creationId xmlns:a16="http://schemas.microsoft.com/office/drawing/2014/main" id="{D0DD65CA-3323-43C0-8DA0-15EE3CEC289B}"/>
+              </a:ext>
+            </a:extLst>
+          </p:cNvPr>
+          <p:cNvSpPr>
+            <a:spLocks noGrp="1"/>
+          </p:cNvSpPr>
+          <p:nvPr>
+            <p:ph type="title"/>
+          </p:nvPr>
+        </p:nvSpPr>
+        <p:spPr/>
+        <p:txBody>
+          <a:bodyPr/>
+          <a:lstStyle/>
+          <a:p>
+            <a:r>
+              <a:rPr lang="en-US" dirty="0"/>
+              <a:t>Parameters I’ve used</a:t>
+            </a:r>
+          </a:p>
+        </p:txBody>
+      </p:sp>
+      <p:sp>
+        <p:nvSpPr>
+          <p:cNvPr id="3" name="Content Placeholder 2">
+            <a:extLst>
+              <a:ext uri="{FF2B5EF4-FFF2-40B4-BE49-F238E27FC236}">
+                <a16:creationId xmlns:a16="http://schemas.microsoft.com/office/drawing/2014/main" id="{25A9323E-935E-4D45-AA2C-C68A5033C1B2}"/>
+              </a:ext>
+            </a:extLst>
+          </p:cNvPr>
+          <p:cNvSpPr>
+            <a:spLocks noGrp="1"/>
+          </p:cNvSpPr>
+          <p:nvPr>
+            <p:ph idx="1"/>
+          </p:nvPr>
+        </p:nvSpPr>
+        <p:spPr/>
+        <p:txBody>
+          <a:bodyPr/>
+          <a:lstStyle/>
+          <a:p>
+            <a:r>
+              <a:rPr lang="en-US" dirty="0"/>
+              <a:t>voxel-level stats: </a:t>
+            </a:r>
+          </a:p>
+          <a:p>
+            <a:pPr lvl="1"/>
+            <a:r>
+              <a:rPr lang="en-US" dirty="0"/>
+              <a:t>100 permutations (more is better – some people do 1000 – but it’s computationally expensive and I honestly think that 100 is fine)</a:t>
+            </a:r>
+          </a:p>
+          <a:p>
+            <a:pPr lvl="1"/>
+            <a:r>
+              <a:rPr lang="en-US" dirty="0"/>
+              <a:t>Keep voxels if </a:t>
+            </a:r>
+            <a:r>
+              <a:rPr lang="en-US" i="1" dirty="0"/>
+              <a:t>p</a:t>
+            </a:r>
+            <a:r>
+              <a:rPr lang="en-US" dirty="0"/>
+              <a:t> &lt; 0.01</a:t>
+            </a:r>
+          </a:p>
+          <a:p>
+            <a:r>
+              <a:rPr lang="en-US" dirty="0"/>
+              <a:t>Cluster-level stats:</a:t>
+            </a:r>
+          </a:p>
+          <a:p>
+            <a:pPr lvl="1"/>
+            <a:r>
+              <a:rPr lang="en-US" dirty="0"/>
+              <a:t>Identifying clusters with </a:t>
+            </a:r>
+            <a:r>
+              <a:rPr lang="en-US" dirty="0" err="1"/>
+              <a:t>dbscan</a:t>
+            </a:r>
+            <a:r>
+              <a:rPr lang="en-US" dirty="0"/>
+              <a:t>:</a:t>
+            </a:r>
+          </a:p>
+          <a:p>
+            <a:pPr lvl="2"/>
+            <a:r>
+              <a:rPr lang="en-US" dirty="0"/>
+              <a:t>Epsilon = 3</a:t>
+            </a:r>
+          </a:p>
+          <a:p>
+            <a:pPr lvl="2"/>
+            <a:r>
+              <a:rPr lang="en-US" dirty="0" err="1"/>
+              <a:t>Minpts</a:t>
+            </a:r>
+            <a:r>
+              <a:rPr lang="en-US" dirty="0"/>
+              <a:t> = 1</a:t>
+            </a:r>
+          </a:p>
+          <a:p>
+            <a:pPr lvl="2"/>
+            <a:r>
+              <a:rPr lang="en-US" dirty="0"/>
+              <a:t>Input format = matrix of straight-line distances between voxels</a:t>
+            </a:r>
+          </a:p>
+          <a:p>
+            <a:pPr lvl="1"/>
+            <a:r>
+              <a:rPr lang="en-US" dirty="0"/>
+              <a:t>Keep voxels if they belong to a cluster where FDR-corrected q &lt; 0.05</a:t>
+            </a:r>
+          </a:p>
+        </p:txBody>
+      </p:sp>
+    </p:spTree>
+    <p:extLst>
+      <p:ext uri="{BB962C8B-B14F-4D97-AF65-F5344CB8AC3E}">
+        <p14:creationId xmlns:p14="http://schemas.microsoft.com/office/powerpoint/2010/main" val="1078854615"/>
+      </p:ext>
+    </p:extLst>
+  </p:cSld>
+  <p:clrMapOvr>
+    <a:masterClrMapping/>
+  </p:clrMapOvr>
+</p:sld>
+</file>
+
 <file path=ppt/slides/slide2.xml><?xml version="1.0" encoding="utf-8"?>
 <p:sld xmlns:a="http://schemas.openxmlformats.org/drawingml/2006/main" xmlns:r="http://schemas.openxmlformats.org/officeDocument/2006/relationships" xmlns:p="http://schemas.openxmlformats.org/presentationml/2006/main">
   <p:cSld>

</xml_diff>

<commit_message>
updated the searchlight RSA explainer
</commit_message>
<xml_diff>
--- a/Explainers/SearchlightRSA.pptx
+++ b/Explainers/SearchlightRSA.pptx
@@ -302,7 +302,7 @@
           <a:p>
             <a:fld id="{0C5A9D22-2270-48BF-829C-A539854D81CB}" type="datetimeFigureOut">
               <a:rPr lang="en-US" smtClean="0"/>
-              <a:t>9/29/2020</a:t>
+              <a:t>10/27/2020</a:t>
             </a:fld>
             <a:endParaRPr lang="en-US"/>
           </a:p>
@@ -500,7 +500,7 @@
           <a:p>
             <a:fld id="{0C5A9D22-2270-48BF-829C-A539854D81CB}" type="datetimeFigureOut">
               <a:rPr lang="en-US" smtClean="0"/>
-              <a:t>9/29/2020</a:t>
+              <a:t>10/27/2020</a:t>
             </a:fld>
             <a:endParaRPr lang="en-US"/>
           </a:p>
@@ -708,7 +708,7 @@
           <a:p>
             <a:fld id="{0C5A9D22-2270-48BF-829C-A539854D81CB}" type="datetimeFigureOut">
               <a:rPr lang="en-US" smtClean="0"/>
-              <a:t>9/29/2020</a:t>
+              <a:t>10/27/2020</a:t>
             </a:fld>
             <a:endParaRPr lang="en-US"/>
           </a:p>
@@ -906,7 +906,7 @@
           <a:p>
             <a:fld id="{0C5A9D22-2270-48BF-829C-A539854D81CB}" type="datetimeFigureOut">
               <a:rPr lang="en-US" smtClean="0"/>
-              <a:t>9/29/2020</a:t>
+              <a:t>10/27/2020</a:t>
             </a:fld>
             <a:endParaRPr lang="en-US"/>
           </a:p>
@@ -1181,7 +1181,7 @@
           <a:p>
             <a:fld id="{0C5A9D22-2270-48BF-829C-A539854D81CB}" type="datetimeFigureOut">
               <a:rPr lang="en-US" smtClean="0"/>
-              <a:t>9/29/2020</a:t>
+              <a:t>10/27/2020</a:t>
             </a:fld>
             <a:endParaRPr lang="en-US"/>
           </a:p>
@@ -1446,7 +1446,7 @@
           <a:p>
             <a:fld id="{0C5A9D22-2270-48BF-829C-A539854D81CB}" type="datetimeFigureOut">
               <a:rPr lang="en-US" smtClean="0"/>
-              <a:t>9/29/2020</a:t>
+              <a:t>10/27/2020</a:t>
             </a:fld>
             <a:endParaRPr lang="en-US"/>
           </a:p>
@@ -1858,7 +1858,7 @@
           <a:p>
             <a:fld id="{0C5A9D22-2270-48BF-829C-A539854D81CB}" type="datetimeFigureOut">
               <a:rPr lang="en-US" smtClean="0"/>
-              <a:t>9/29/2020</a:t>
+              <a:t>10/27/2020</a:t>
             </a:fld>
             <a:endParaRPr lang="en-US"/>
           </a:p>
@@ -1999,7 +1999,7 @@
           <a:p>
             <a:fld id="{0C5A9D22-2270-48BF-829C-A539854D81CB}" type="datetimeFigureOut">
               <a:rPr lang="en-US" smtClean="0"/>
-              <a:t>9/29/2020</a:t>
+              <a:t>10/27/2020</a:t>
             </a:fld>
             <a:endParaRPr lang="en-US"/>
           </a:p>
@@ -2112,7 +2112,7 @@
           <a:p>
             <a:fld id="{0C5A9D22-2270-48BF-829C-A539854D81CB}" type="datetimeFigureOut">
               <a:rPr lang="en-US" smtClean="0"/>
-              <a:t>9/29/2020</a:t>
+              <a:t>10/27/2020</a:t>
             </a:fld>
             <a:endParaRPr lang="en-US"/>
           </a:p>
@@ -2423,7 +2423,7 @@
           <a:p>
             <a:fld id="{0C5A9D22-2270-48BF-829C-A539854D81CB}" type="datetimeFigureOut">
               <a:rPr lang="en-US" smtClean="0"/>
-              <a:t>9/29/2020</a:t>
+              <a:t>10/27/2020</a:t>
             </a:fld>
             <a:endParaRPr lang="en-US"/>
           </a:p>
@@ -2711,7 +2711,7 @@
           <a:p>
             <a:fld id="{0C5A9D22-2270-48BF-829C-A539854D81CB}" type="datetimeFigureOut">
               <a:rPr lang="en-US" smtClean="0"/>
-              <a:t>9/29/2020</a:t>
+              <a:t>10/27/2020</a:t>
             </a:fld>
             <a:endParaRPr lang="en-US"/>
           </a:p>
@@ -2952,7 +2952,7 @@
           <a:p>
             <a:fld id="{0C5A9D22-2270-48BF-829C-A539854D81CB}" type="datetimeFigureOut">
               <a:rPr lang="en-US" smtClean="0"/>
-              <a:t>9/29/2020</a:t>
+              <a:t>10/27/2020</a:t>
             </a:fld>
             <a:endParaRPr lang="en-US"/>
           </a:p>
@@ -3508,6 +3508,16 @@
               <a:rPr lang="en-US" dirty="0"/>
               <a:t> 3-dimensional pixel, the basic unit we can measure using fMRI. Ours are 3mm cubes</a:t>
             </a:r>
+          </a:p>
+          <a:p>
+            <a:r>
+              <a:rPr lang="en-US" u="sng" dirty="0"/>
+              <a:t>Brain patterns:</a:t>
+            </a:r>
+            <a:r>
+              <a:rPr lang="en-US" dirty="0"/>
+              <a:t> matrix of neural responses for a given region or searchlight (generally dimensions = items/videos x voxels in the region)</a:t>
+            </a:r>
             <a:endParaRPr lang="en-US" u="sng" dirty="0"/>
           </a:p>
         </p:txBody>
@@ -3748,7 +3758,7 @@
         <p:spPr>
           <a:xfrm>
             <a:off x="1228846" y="2560859"/>
-            <a:ext cx="1593065" cy="369332"/>
+            <a:ext cx="2698046" cy="369332"/>
           </a:xfrm>
           <a:prstGeom prst="rect">
             <a:avLst/>
@@ -3763,7 +3773,7 @@
           <a:p>
             <a:r>
               <a:rPr lang="en-US" dirty="0"/>
-              <a:t>In each voxel…</a:t>
+              <a:t>In each grey matter voxel…</a:t>
             </a:r>
           </a:p>
         </p:txBody>
@@ -3782,8 +3792,8 @@
         </p:nvSpPr>
         <p:spPr>
           <a:xfrm>
-            <a:off x="1157539" y="3051705"/>
-            <a:ext cx="6805261" cy="1200329"/>
+            <a:off x="1157539" y="2903634"/>
+            <a:ext cx="9753696" cy="1477328"/>
           </a:xfrm>
           <a:prstGeom prst="rect">
             <a:avLst/>
@@ -3801,7 +3811,7 @@
             </a:pPr>
             <a:r>
               <a:rPr lang="en-US" dirty="0"/>
-              <a:t>Shuffle the brain RDM</a:t>
+              <a:t>Get the brain patterns matrix (videos x voxels) for the surrounding searchlight</a:t>
             </a:r>
           </a:p>
           <a:p>
@@ -3810,7 +3820,16 @@
             </a:pPr>
             <a:r>
               <a:rPr lang="en-US" dirty="0"/>
-              <a:t>Correlate the shuffled brain RDM with the behavioral RDM</a:t>
+              <a:t>Shuffle the brain patterns matrix (re-order the videos) and make an RDM based on the shuffled matrix</a:t>
+            </a:r>
+          </a:p>
+          <a:p>
+            <a:pPr marL="342900" indent="-342900">
+              <a:buAutoNum type="arabicPeriod"/>
+            </a:pPr>
+            <a:r>
+              <a:rPr lang="en-US" dirty="0"/>
+              <a:t>Correlate the shuffled brain RDM with the behavioral/target RDM</a:t>
             </a:r>
           </a:p>
           <a:p>
@@ -4447,7 +4466,7 @@
             </a:pPr>
             <a:r>
               <a:rPr lang="en-US" dirty="0"/>
-              <a:t>Identify the clusters in the corrected shuffle data, and measure their size</a:t>
+              <a:t>Identify the clusters in the corrected shuffled data, and measure their size</a:t>
             </a:r>
           </a:p>
         </p:txBody>
@@ -4536,8 +4555,8 @@
         </p:nvSpPr>
         <p:spPr>
           <a:xfrm>
-            <a:off x="1103914" y="4761321"/>
-            <a:ext cx="7775147" cy="1200329"/>
+            <a:off x="1103915" y="4761321"/>
+            <a:ext cx="7247012" cy="1477328"/>
           </a:xfrm>
           <a:prstGeom prst="rect">
             <a:avLst/>
@@ -4583,7 +4602,7 @@
           <a:p>
             <a:r>
               <a:rPr lang="en-US" dirty="0"/>
-              <a:t>…If it’s larger than the mass of the distribution (using q &lt; 0.05) </a:t>
+              <a:t>…If it’s larger than the mass of the distribution (using FDR test q &lt; 0.05) </a:t>
             </a:r>
             <a:r>
               <a:rPr lang="en-US" dirty="0">
@@ -6019,10 +6038,10 @@
         </p:nvGrpSpPr>
         <p:grpSpPr>
           <a:xfrm>
-            <a:off x="1377711" y="5690695"/>
-            <a:ext cx="1364790" cy="928218"/>
-            <a:chOff x="3743406" y="4485346"/>
-            <a:chExt cx="1364790" cy="928218"/>
+            <a:off x="1377712" y="5690695"/>
+            <a:ext cx="1364789" cy="961881"/>
+            <a:chOff x="3743407" y="4485346"/>
+            <a:chExt cx="1364789" cy="961881"/>
           </a:xfrm>
         </p:grpSpPr>
         <p:sp>
@@ -6094,8 +6113,8 @@
           </p:nvSpPr>
           <p:spPr>
             <a:xfrm rot="16200000">
-              <a:off x="3616609" y="4978989"/>
-              <a:ext cx="561372" cy="307777"/>
+              <a:off x="3582947" y="4978989"/>
+              <a:ext cx="628698" cy="307777"/>
             </a:xfrm>
             <a:prstGeom prst="rect">
               <a:avLst/>
@@ -6110,7 +6129,7 @@
             <a:p>
               <a:r>
                 <a:rPr lang="en-US" sz="1400" dirty="0"/>
-                <a:t>items</a:t>
+                <a:t>videos</a:t>
               </a:r>
             </a:p>
           </p:txBody>
@@ -6204,10 +6223,10 @@
         </p:nvGrpSpPr>
         <p:grpSpPr>
           <a:xfrm>
-            <a:off x="3581018" y="5939405"/>
-            <a:ext cx="969408" cy="679508"/>
-            <a:chOff x="3758431" y="4734056"/>
-            <a:chExt cx="969408" cy="679508"/>
+            <a:off x="3581019" y="5939405"/>
+            <a:ext cx="969407" cy="679508"/>
+            <a:chOff x="3758432" y="4734056"/>
+            <a:chExt cx="969407" cy="679508"/>
           </a:xfrm>
         </p:grpSpPr>
         <p:sp>
@@ -6282,8 +6301,8 @@
           </p:nvSpPr>
           <p:spPr>
             <a:xfrm rot="16200000">
-              <a:off x="3631634" y="4912223"/>
-              <a:ext cx="561372" cy="307777"/>
+              <a:off x="3597972" y="4912223"/>
+              <a:ext cx="628698" cy="307777"/>
             </a:xfrm>
             <a:prstGeom prst="rect">
               <a:avLst/>
@@ -6298,7 +6317,7 @@
             <a:p>
               <a:r>
                 <a:rPr lang="en-US" sz="1400" dirty="0"/>
-                <a:t>items</a:t>
+                <a:t>videos</a:t>
               </a:r>
             </a:p>
           </p:txBody>
@@ -6319,7 +6338,7 @@
         <p:spPr>
           <a:xfrm>
             <a:off x="3931412" y="5690695"/>
-            <a:ext cx="561372" cy="307777"/>
+            <a:ext cx="628698" cy="307777"/>
           </a:xfrm>
           <a:prstGeom prst="rect">
             <a:avLst/>
@@ -6334,7 +6353,7 @@
           <a:p>
             <a:r>
               <a:rPr lang="en-US" sz="1400" dirty="0"/>
-              <a:t>items</a:t>
+              <a:t>videos</a:t>
             </a:r>
           </a:p>
         </p:txBody>
@@ -6431,10 +6450,10 @@
         </p:nvGrpSpPr>
         <p:grpSpPr>
           <a:xfrm>
-            <a:off x="5205680" y="5939405"/>
-            <a:ext cx="969408" cy="679508"/>
-            <a:chOff x="3758431" y="4734056"/>
-            <a:chExt cx="969408" cy="679508"/>
+            <a:off x="5205681" y="5939405"/>
+            <a:ext cx="969407" cy="679508"/>
+            <a:chOff x="3758432" y="4734056"/>
+            <a:chExt cx="969407" cy="679508"/>
           </a:xfrm>
         </p:grpSpPr>
         <p:sp>
@@ -6509,8 +6528,8 @@
           </p:nvSpPr>
           <p:spPr>
             <a:xfrm rot="16200000">
-              <a:off x="3631634" y="4912223"/>
-              <a:ext cx="561372" cy="307777"/>
+              <a:off x="3597972" y="4912223"/>
+              <a:ext cx="628698" cy="307777"/>
             </a:xfrm>
             <a:prstGeom prst="rect">
               <a:avLst/>
@@ -6525,7 +6544,7 @@
             <a:p>
               <a:r>
                 <a:rPr lang="en-US" sz="1400" dirty="0"/>
-                <a:t>items</a:t>
+                <a:t>videos</a:t>
               </a:r>
             </a:p>
           </p:txBody>
@@ -6546,7 +6565,7 @@
         <p:spPr>
           <a:xfrm>
             <a:off x="5556074" y="5690695"/>
-            <a:ext cx="561372" cy="307777"/>
+            <a:ext cx="628698" cy="307777"/>
           </a:xfrm>
           <a:prstGeom prst="rect">
             <a:avLst/>
@@ -6561,7 +6580,7 @@
           <a:p>
             <a:r>
               <a:rPr lang="en-US" sz="1400" dirty="0"/>
-              <a:t>items</a:t>
+              <a:t>videos</a:t>
             </a:r>
           </a:p>
         </p:txBody>

</xml_diff>